<commit_message>
add better demo for modal
</commit_message>
<xml_diff>
--- a/slides/week-5.pptx
+++ b/slides/week-5.pptx
@@ -5,7 +5,7 @@
     <p:sldMasterId id="2147483648" r:id="rId1"/>
   </p:sldMasterIdLst>
   <p:notesMasterIdLst>
-    <p:notesMasterId r:id="rId56"/>
+    <p:notesMasterId r:id="rId59"/>
   </p:notesMasterIdLst>
   <p:sldIdLst>
     <p:sldId id="256" r:id="rId2"/>
@@ -59,9 +59,12 @@
     <p:sldId id="375" r:id="rId50"/>
     <p:sldId id="379" r:id="rId51"/>
     <p:sldId id="376" r:id="rId52"/>
-    <p:sldId id="359" r:id="rId53"/>
-    <p:sldId id="357" r:id="rId54"/>
-    <p:sldId id="297" r:id="rId55"/>
+    <p:sldId id="381" r:id="rId53"/>
+    <p:sldId id="382" r:id="rId54"/>
+    <p:sldId id="380" r:id="rId55"/>
+    <p:sldId id="359" r:id="rId56"/>
+    <p:sldId id="357" r:id="rId57"/>
+    <p:sldId id="297" r:id="rId58"/>
   </p:sldIdLst>
   <p:sldSz cx="13004800" cy="9753600"/>
   <p:notesSz cx="13004800" cy="9753600"/>
@@ -6354,7 +6357,7 @@
                 <a:latin typeface="Georgia" panose="02040502050405020303" pitchFamily="18" charset="0"/>
                 <a:cs typeface="Lora"/>
               </a:rPr>
-              <a:t>“The Grid”</a:t>
+              <a:t>Fun CSS tricks</a:t>
             </a:r>
           </a:p>
           <a:p>
@@ -6373,7 +6376,7 @@
                 <a:latin typeface="Georgia" panose="02040502050405020303" pitchFamily="18" charset="0"/>
                 <a:cs typeface="Lora"/>
               </a:rPr>
-              <a:t>Fun CSS tricks</a:t>
+              <a:t>“The Grid”</a:t>
             </a:r>
           </a:p>
           <a:p>
@@ -10479,7 +10482,7 @@
         <p:spPr>
           <a:xfrm>
             <a:off x="1775460" y="2438400"/>
-            <a:ext cx="10060940" cy="6637715"/>
+            <a:ext cx="10060940" cy="6388928"/>
           </a:xfrm>
           <a:prstGeom prst="rect">
             <a:avLst/>
@@ -10497,12 +10500,11 @@
               </a:spcBef>
             </a:pPr>
             <a:r>
-              <a:rPr lang="en-US" sz="2800" spc="-5" dirty="0">
-                <a:solidFill>
-                  <a:srgbClr val="5F5F5F"/>
-                </a:solidFill>
-                <a:latin typeface="Georgia" panose="02040502050405020303" pitchFamily="18" charset="0"/>
-                <a:cs typeface="Lora"/>
+              <a:rPr lang="en-US" sz="3200" spc="-5" dirty="0">
+                <a:solidFill>
+                  <a:srgbClr val="5F5F5F"/>
+                </a:solidFill>
+                <a:latin typeface="Georgia" panose="02040502050405020303" pitchFamily="18" charset="0"/>
               </a:rPr>
               <a:t>Create a new page using this page as a template:</a:t>
             </a:r>
@@ -10536,7 +10538,7 @@
                 <a:cs typeface="Lora"/>
                 <a:hlinkClick r:id="rId2"/>
               </a:rPr>
-              <a:t>https://alistapart.com/d/css-positioning-101/example_a.html</a:t>
+              <a:t>http://kweeket.github.io/dev-101/demos/modal.html</a:t>
             </a:r>
             <a:endParaRPr lang="en-US" sz="2800" spc="-5" dirty="0">
               <a:solidFill>
@@ -10561,6 +10563,76 @@
             </a:endParaRPr>
           </a:p>
           <a:p>
+            <a:pPr marL="12700" marR="1212850">
+              <a:spcBef>
+                <a:spcPts val="100"/>
+              </a:spcBef>
+            </a:pPr>
+            <a:r>
+              <a:rPr lang="en-US" sz="3200" spc="-5" dirty="0">
+                <a:solidFill>
+                  <a:srgbClr val="5F5F5F"/>
+                </a:solidFill>
+                <a:latin typeface="Georgia" panose="02040502050405020303" pitchFamily="18" charset="0"/>
+                <a:cs typeface="Lora"/>
+              </a:rPr>
+              <a:t>Write CSS so that the modal (the </a:t>
+            </a:r>
+            <a:r>
+              <a:rPr lang="en-US" sz="3200" dirty="0">
+                <a:solidFill>
+                  <a:srgbClr val="7F007F"/>
+                </a:solidFill>
+                <a:latin typeface="Consolas"/>
+                <a:cs typeface="Consolas"/>
+              </a:rPr>
+              <a:t>div</a:t>
+            </a:r>
+            <a:r>
+              <a:rPr lang="en-US" sz="3200" spc="-5" dirty="0">
+                <a:solidFill>
+                  <a:srgbClr val="5F5F5F"/>
+                </a:solidFill>
+                <a:latin typeface="Georgia" panose="02040502050405020303" pitchFamily="18" charset="0"/>
+                <a:cs typeface="Lora"/>
+              </a:rPr>
+              <a:t> with the class </a:t>
+            </a:r>
+            <a:r>
+              <a:rPr lang="en-US" sz="3200" dirty="0">
+                <a:solidFill>
+                  <a:srgbClr val="7F007F"/>
+                </a:solidFill>
+                <a:latin typeface="Consolas"/>
+              </a:rPr>
+              <a:t>modal</a:t>
+            </a:r>
+            <a:r>
+              <a:rPr lang="en-US" sz="3200" spc="-5" dirty="0">
+                <a:solidFill>
+                  <a:srgbClr val="5F5F5F"/>
+                </a:solidFill>
+                <a:latin typeface="Georgia" panose="02040502050405020303" pitchFamily="18" charset="0"/>
+                <a:cs typeface="Lora"/>
+              </a:rPr>
+              <a:t>) appears over the boilerplate text</a:t>
+            </a:r>
+          </a:p>
+          <a:p>
+            <a:pPr marL="12700" marR="1212850">
+              <a:spcBef>
+                <a:spcPts val="100"/>
+              </a:spcBef>
+            </a:pPr>
+            <a:endParaRPr lang="en-US" sz="2800" spc="-5" dirty="0">
+              <a:solidFill>
+                <a:srgbClr val="5F5F5F"/>
+              </a:solidFill>
+              <a:latin typeface="Georgia" panose="02040502050405020303" pitchFamily="18" charset="0"/>
+              <a:cs typeface="Lora"/>
+            </a:endParaRPr>
+          </a:p>
+          <a:p>
             <a:pPr marL="469900" marR="1212850" indent="-457200">
               <a:spcBef>
                 <a:spcPts val="100"/>
@@ -10576,56 +10648,14 @@
                 <a:latin typeface="Georgia" panose="02040502050405020303" pitchFamily="18" charset="0"/>
                 <a:cs typeface="Lora"/>
               </a:rPr>
-              <a:t>Give at least one of the boxes relative positioning and apply </a:t>
-            </a:r>
-            <a:r>
-              <a:rPr lang="en-US" sz="2800" dirty="0">
-                <a:solidFill>
-                  <a:srgbClr val="FF0000"/>
-                </a:solidFill>
-                <a:latin typeface="Consolas"/>
-                <a:cs typeface="Consolas"/>
-              </a:rPr>
-              <a:t>left</a:t>
-            </a:r>
-            <a:r>
-              <a:rPr lang="en-US" sz="2800" spc="-5" dirty="0">
-                <a:solidFill>
-                  <a:srgbClr val="5F5F5F"/>
-                </a:solidFill>
-                <a:latin typeface="Georgia" panose="02040502050405020303" pitchFamily="18" charset="0"/>
-                <a:cs typeface="Lora"/>
-              </a:rPr>
-              <a:t>,</a:t>
-            </a:r>
-            <a:r>
-              <a:rPr lang="en-US" sz="2800" dirty="0">
-                <a:solidFill>
-                  <a:srgbClr val="FF0000"/>
-                </a:solidFill>
-                <a:latin typeface="Consolas"/>
-                <a:cs typeface="Consolas"/>
-              </a:rPr>
-              <a:t> top</a:t>
-            </a:r>
-            <a:r>
-              <a:rPr lang="en-US" sz="2800" spc="-5" dirty="0">
-                <a:solidFill>
-                  <a:srgbClr val="5F5F5F"/>
-                </a:solidFill>
-                <a:latin typeface="Georgia" panose="02040502050405020303" pitchFamily="18" charset="0"/>
-                <a:cs typeface="Lora"/>
-              </a:rPr>
-              <a:t>, etc.</a:t>
-            </a:r>
-          </a:p>
-          <a:p>
-            <a:pPr marL="469900" marR="1212850" indent="-457200">
+              <a:t>Apply box model properties to the content until it looks nice</a:t>
+            </a:r>
+          </a:p>
+          <a:p>
+            <a:pPr marL="12700" marR="1212850">
               <a:spcBef>
                 <a:spcPts val="100"/>
               </a:spcBef>
-              <a:buFont typeface="Arial" panose="020B0604020202020204" pitchFamily="34" charset="0"/>
-              <a:buChar char="•"/>
             </a:pPr>
             <a:endParaRPr lang="en-US" sz="2800" spc="-5" dirty="0">
               <a:solidFill>
@@ -10636,12 +10666,10 @@
             </a:endParaRPr>
           </a:p>
           <a:p>
-            <a:pPr marL="469900" marR="1212850" indent="-457200">
+            <a:pPr marL="12700" marR="1212850">
               <a:spcBef>
                 <a:spcPts val="100"/>
               </a:spcBef>
-              <a:buFont typeface="Arial" panose="020B0604020202020204" pitchFamily="34" charset="0"/>
-              <a:buChar char="•"/>
             </a:pPr>
             <a:r>
               <a:rPr lang="en-US" sz="2800" spc="-5" dirty="0">
@@ -10651,16 +10679,14 @@
                 <a:latin typeface="Georgia" panose="02040502050405020303" pitchFamily="18" charset="0"/>
                 <a:cs typeface="Lora"/>
               </a:rPr>
-              <a:t>Give at least one of the boxes absolute positioning.</a:t>
-            </a:r>
-          </a:p>
-          <a:p>
-            <a:pPr marL="469900" marR="1212850" indent="-457200">
+              <a:t>Recall that you target a class in CSS like this:</a:t>
+            </a:r>
+          </a:p>
+          <a:p>
+            <a:pPr marL="12700" marR="1212850">
               <a:spcBef>
                 <a:spcPts val="100"/>
               </a:spcBef>
-              <a:buFont typeface="Arial" panose="020B0604020202020204" pitchFamily="34" charset="0"/>
-              <a:buChar char="•"/>
             </a:pPr>
             <a:endParaRPr lang="en-US" sz="2800" spc="-5" dirty="0">
               <a:solidFill>
@@ -10671,70 +10697,20 @@
             </a:endParaRPr>
           </a:p>
           <a:p>
-            <a:pPr marL="927100" marR="1212850" lvl="1" indent="-457200">
-              <a:spcBef>
-                <a:spcPts val="100"/>
-              </a:spcBef>
-              <a:buFont typeface="Arial" panose="020B0604020202020204" pitchFamily="34" charset="0"/>
-              <a:buChar char="•"/>
-            </a:pPr>
-            <a:r>
-              <a:rPr lang="en-US" sz="2800" spc="-5" dirty="0">
-                <a:solidFill>
-                  <a:srgbClr val="5F5F5F"/>
-                </a:solidFill>
-                <a:latin typeface="Georgia" panose="02040502050405020303" pitchFamily="18" charset="0"/>
-                <a:cs typeface="Lora"/>
-              </a:rPr>
-              <a:t>Try putting a </a:t>
-            </a:r>
-            <a:r>
-              <a:rPr lang="en-US" sz="2800" dirty="0">
-                <a:solidFill>
-                  <a:srgbClr val="7F007F"/>
-                </a:solidFill>
-                <a:latin typeface="Consolas"/>
-                <a:cs typeface="Lora"/>
-              </a:rPr>
-              <a:t>section</a:t>
-            </a:r>
-            <a:r>
-              <a:rPr lang="en-US" sz="2800" spc="-5" dirty="0">
-                <a:solidFill>
-                  <a:srgbClr val="5F5F5F"/>
-                </a:solidFill>
-                <a:latin typeface="Georgia" panose="02040502050405020303" pitchFamily="18" charset="0"/>
-                <a:cs typeface="Lora"/>
-              </a:rPr>
-              <a:t> around the boxes and give that </a:t>
-            </a:r>
-            <a:r>
-              <a:rPr lang="en-US" sz="2800" dirty="0">
-                <a:solidFill>
-                  <a:srgbClr val="0000FF"/>
-                </a:solidFill>
-                <a:latin typeface="Consolas"/>
-                <a:cs typeface="Consolas"/>
-              </a:rPr>
-              <a:t>relative </a:t>
-            </a:r>
-            <a:r>
-              <a:rPr lang="en-US" sz="2800" spc="-5" dirty="0">
-                <a:solidFill>
-                  <a:srgbClr val="5F5F5F"/>
-                </a:solidFill>
-                <a:latin typeface="Georgia" panose="02040502050405020303" pitchFamily="18" charset="0"/>
-                <a:cs typeface="Lora"/>
-              </a:rPr>
-              <a:t>positioning – what happens as you resize the browser?</a:t>
-            </a:r>
-          </a:p>
-          <a:p>
             <a:pPr marL="12700" marR="1212850">
               <a:spcBef>
                 <a:spcPts val="100"/>
               </a:spcBef>
             </a:pPr>
+            <a:r>
+              <a:rPr lang="en-US" sz="2800" dirty="0">
+                <a:solidFill>
+                  <a:srgbClr val="7F007F"/>
+                </a:solidFill>
+                <a:latin typeface="Consolas"/>
+              </a:rPr>
+              <a:t>.modal</a:t>
+            </a:r>
             <a:endParaRPr lang="en-US" sz="2800" spc="-5" dirty="0">
               <a:solidFill>
                 <a:srgbClr val="5F5F5F"/>
@@ -12103,7 +12079,7 @@
                 <a:latin typeface="Georgia" panose="02040502050405020303" pitchFamily="18" charset="0"/>
                 <a:cs typeface="Lora"/>
               </a:rPr>
-              <a:t>Some things you can test for:</a:t>
+              <a:t>Some things you can use a media query to detect:</a:t>
             </a:r>
           </a:p>
           <a:p>
@@ -13314,7 +13290,7 @@
                 <a:latin typeface="Georgia" panose="02040502050405020303" pitchFamily="18" charset="0"/>
                 <a:cs typeface="Lora"/>
               </a:rPr>
-              <a:t>Most modern “mobile first” websites have CSS that apply to phone-sized screens first, then anything that is specific to bigger screens goes in media queries that test for a minimum screen size</a:t>
+              <a:t>Most modern “mobile first” websites have CSS that apply to phone-sized screens first, then anything that is specific to bigger screens goes in media queries that test for a minimum screen width</a:t>
             </a:r>
           </a:p>
           <a:p>
@@ -13564,7 +13540,7 @@
         <p:spPr>
           <a:xfrm>
             <a:off x="1320800" y="2514600"/>
-            <a:ext cx="10972800" cy="5519460"/>
+            <a:ext cx="10972800" cy="6155531"/>
           </a:xfrm>
           <a:prstGeom prst="rect">
             <a:avLst/>
@@ -13589,7 +13565,7 @@
                 <a:latin typeface="Consolas" panose="020B0609020204030204" pitchFamily="49" charset="0"/>
                 <a:cs typeface="Courier New"/>
               </a:rPr>
-              <a:t>/* Some CSS that is used for phones */</a:t>
+              <a:t>/* 	CSS that is used for phones, and also </a:t>
             </a:r>
           </a:p>
           <a:p>
@@ -13598,6 +13574,33 @@
                 <a:spcPts val="1550"/>
               </a:spcBef>
             </a:pPr>
+            <a:r>
+              <a:rPr lang="en-US" sz="2800" spc="-5" dirty="0">
+                <a:solidFill>
+                  <a:srgbClr val="3FAA54"/>
+                </a:solidFill>
+                <a:latin typeface="Consolas" panose="020B0609020204030204" pitchFamily="49" charset="0"/>
+                <a:cs typeface="Courier New"/>
+              </a:rPr>
+              <a:t>	applies generally </a:t>
+            </a:r>
+          </a:p>
+          <a:p>
+            <a:pPr marL="12700" marR="5080">
+              <a:spcBef>
+                <a:spcPts val="1550"/>
+              </a:spcBef>
+            </a:pPr>
+            <a:r>
+              <a:rPr lang="en-US" sz="2800" spc="-5" dirty="0">
+                <a:solidFill>
+                  <a:srgbClr val="3FAA54"/>
+                </a:solidFill>
+                <a:latin typeface="Consolas" panose="020B0609020204030204" pitchFamily="49" charset="0"/>
+                <a:cs typeface="Courier New"/>
+              </a:rPr>
+              <a:t>*/</a:t>
+            </a:r>
             <a:endParaRPr lang="en-US" sz="2800" spc="45" dirty="0">
               <a:solidFill>
                 <a:srgbClr val="5F5F5F"/>
@@ -14077,7 +14080,7 @@
         <p:spPr>
           <a:xfrm>
             <a:off x="1775460" y="2438400"/>
-            <a:ext cx="10060940" cy="2239074"/>
+            <a:ext cx="10060940" cy="6504345"/>
           </a:xfrm>
           <a:prstGeom prst="rect">
             <a:avLst/>
@@ -14095,7 +14098,7 @@
               </a:spcBef>
             </a:pPr>
             <a:r>
-              <a:rPr lang="en-US" sz="2800" spc="-5" dirty="0">
+              <a:rPr lang="en-US" sz="3600" spc="-5" dirty="0">
                 <a:solidFill>
                   <a:srgbClr val="5F5F5F"/>
                 </a:solidFill>
@@ -14111,13 +14114,115 @@
                 <a:spcPts val="100"/>
               </a:spcBef>
             </a:pPr>
-            <a:endParaRPr lang="en-US" sz="3100" spc="-5" dirty="0">
+            <a:endParaRPr lang="en-US" sz="3600" spc="-5" dirty="0">
               <a:solidFill>
                 <a:srgbClr val="5F5F5F"/>
               </a:solidFill>
               <a:latin typeface="Georgia" panose="02040502050405020303" pitchFamily="18" charset="0"/>
               <a:cs typeface="Lora"/>
             </a:endParaRPr>
+          </a:p>
+          <a:p>
+            <a:pPr marL="12700" marR="1212850">
+              <a:spcBef>
+                <a:spcPts val="100"/>
+              </a:spcBef>
+            </a:pPr>
+            <a:r>
+              <a:rPr lang="en-US" sz="3600" spc="-5" dirty="0">
+                <a:solidFill>
+                  <a:srgbClr val="5F5F5F"/>
+                </a:solidFill>
+                <a:latin typeface="Georgia" panose="02040502050405020303" pitchFamily="18" charset="0"/>
+                <a:cs typeface="Lora"/>
+              </a:rPr>
+              <a:t>Things to </a:t>
+            </a:r>
+            <a:r>
+              <a:rPr lang="en-US" sz="3600" spc="-5">
+                <a:solidFill>
+                  <a:srgbClr val="5F5F5F"/>
+                </a:solidFill>
+                <a:latin typeface="Georgia" panose="02040502050405020303" pitchFamily="18" charset="0"/>
+                <a:cs typeface="Lora"/>
+              </a:rPr>
+              <a:t>consider doing:</a:t>
+            </a:r>
+            <a:endParaRPr lang="en-US" sz="3600" spc="-5" dirty="0">
+              <a:solidFill>
+                <a:srgbClr val="5F5F5F"/>
+              </a:solidFill>
+              <a:latin typeface="Georgia" panose="02040502050405020303" pitchFamily="18" charset="0"/>
+              <a:cs typeface="Lora"/>
+            </a:endParaRPr>
+          </a:p>
+          <a:p>
+            <a:pPr marL="12700" marR="1212850">
+              <a:spcBef>
+                <a:spcPts val="100"/>
+              </a:spcBef>
+            </a:pPr>
+            <a:endParaRPr lang="en-US" sz="3600" spc="-5" dirty="0">
+              <a:solidFill>
+                <a:srgbClr val="5F5F5F"/>
+              </a:solidFill>
+              <a:latin typeface="Georgia" panose="02040502050405020303" pitchFamily="18" charset="0"/>
+              <a:cs typeface="Lora"/>
+            </a:endParaRPr>
+          </a:p>
+          <a:p>
+            <a:pPr marL="584200" marR="1212850" indent="-571500">
+              <a:spcBef>
+                <a:spcPts val="100"/>
+              </a:spcBef>
+              <a:buFont typeface="Arial" panose="020B0604020202020204" pitchFamily="34" charset="0"/>
+              <a:buChar char="•"/>
+            </a:pPr>
+            <a:r>
+              <a:rPr lang="en-US" sz="3600" spc="-5" dirty="0">
+                <a:solidFill>
+                  <a:srgbClr val="5F5F5F"/>
+                </a:solidFill>
+                <a:latin typeface="Georgia" panose="02040502050405020303" pitchFamily="18" charset="0"/>
+                <a:cs typeface="Lora"/>
+              </a:rPr>
+              <a:t>Float a section right only in desktop </a:t>
+            </a:r>
+          </a:p>
+          <a:p>
+            <a:pPr marL="584200" marR="1212850" indent="-571500">
+              <a:spcBef>
+                <a:spcPts val="100"/>
+              </a:spcBef>
+              <a:buFont typeface="Arial" panose="020B0604020202020204" pitchFamily="34" charset="0"/>
+              <a:buChar char="•"/>
+            </a:pPr>
+            <a:endParaRPr lang="en-US" sz="3600" spc="-5" dirty="0">
+              <a:solidFill>
+                <a:srgbClr val="5F5F5F"/>
+              </a:solidFill>
+              <a:latin typeface="Georgia" panose="02040502050405020303" pitchFamily="18" charset="0"/>
+              <a:cs typeface="Lora"/>
+            </a:endParaRPr>
+          </a:p>
+          <a:p>
+            <a:pPr marL="584200" marR="1212850" indent="-571500">
+              <a:spcBef>
+                <a:spcPts val="100"/>
+              </a:spcBef>
+              <a:buFont typeface="Arial" panose="020B0604020202020204" pitchFamily="34" charset="0"/>
+              <a:buChar char="•"/>
+            </a:pPr>
+            <a:r>
+              <a:rPr lang="en-US" sz="3600" spc="-5" dirty="0">
+                <a:solidFill>
+                  <a:srgbClr val="5F5F5F"/>
+                </a:solidFill>
+                <a:latin typeface="Georgia" panose="02040502050405020303" pitchFamily="18" charset="0"/>
+                <a:cs typeface="Lora"/>
+              </a:rPr>
+              <a:t>Give buttons or links in navigation a bigger “click target” in mobile</a:t>
+            </a:r>
           </a:p>
           <a:p>
             <a:pPr marL="12700" marR="1212850">
@@ -18110,8 +18215,8 @@
         </p:nvSpPr>
         <p:spPr>
           <a:xfrm>
-            <a:off x="1036658" y="1513211"/>
-            <a:ext cx="10266342" cy="7748285"/>
+            <a:off x="1016000" y="1212235"/>
+            <a:ext cx="10266342" cy="7686730"/>
           </a:xfrm>
           <a:prstGeom prst="rect">
             <a:avLst/>
@@ -18122,16 +18227,6 @@
             <a:spAutoFit/>
           </a:bodyPr>
           <a:lstStyle/>
-          <a:p>
-            <a:pPr marL="373380" marR="5080"/>
-            <a:endParaRPr lang="en-US" sz="1000" dirty="0">
-              <a:solidFill>
-                <a:srgbClr val="FF0000"/>
-              </a:solidFill>
-              <a:latin typeface="Consolas"/>
-              <a:cs typeface="Consolas"/>
-            </a:endParaRPr>
-          </a:p>
           <a:p>
             <a:pPr marL="373380" marR="5080"/>
             <a:r>
@@ -18229,12 +18324,26 @@
             </a:r>
           </a:p>
           <a:p>
-            <a:pPr marL="830580" marR="5080" indent="-457200">
-              <a:buFont typeface="Arial" panose="020B0604020202020204" pitchFamily="34" charset="0"/>
-              <a:buChar char="•"/>
-            </a:pPr>
-            <a:endParaRPr lang="en-US" sz="2800" spc="-5" dirty="0">
-              <a:latin typeface="Georgia" panose="02040502050405020303" pitchFamily="18" charset="0"/>
+            <a:pPr marL="373380" marR="5080"/>
+            <a:r>
+              <a:rPr lang="en-US" sz="2800" dirty="0">
+                <a:solidFill>
+                  <a:srgbClr val="0000FF"/>
+                </a:solidFill>
+                <a:latin typeface="Consolas"/>
+                <a:cs typeface="Consolas"/>
+              </a:rPr>
+              <a:t>}</a:t>
+            </a:r>
+          </a:p>
+          <a:p>
+            <a:pPr marL="373380" marR="5080"/>
+            <a:endParaRPr lang="en-US" sz="2800" dirty="0">
+              <a:solidFill>
+                <a:srgbClr val="7F007F"/>
+              </a:solidFill>
+              <a:latin typeface="Consolas"/>
+              <a:cs typeface="Consolas"/>
             </a:endParaRPr>
           </a:p>
           <a:p>
@@ -18305,12 +18414,6 @@
               </a:rPr>
               <a:t>}</a:t>
             </a:r>
-          </a:p>
-          <a:p>
-            <a:pPr marL="373380" marR="5080"/>
-            <a:endParaRPr lang="en-US" sz="3200" spc="-5" dirty="0">
-              <a:latin typeface="Georgia" panose="02040502050405020303" pitchFamily="18" charset="0"/>
-            </a:endParaRPr>
           </a:p>
           <a:p>
             <a:pPr marL="373380" marR="5080"/>
@@ -18662,13 +18765,13 @@
       </p:grpSpPr>
       <p:sp>
         <p:nvSpPr>
-          <p:cNvPr id="2" name="object 2"/>
+          <p:cNvPr id="6" name="object 2"/>
           <p:cNvSpPr/>
           <p:nvPr/>
         </p:nvSpPr>
         <p:spPr>
           <a:xfrm>
-            <a:off x="-20983" y="0"/>
+            <a:off x="-4445" y="0"/>
             <a:ext cx="13004800" cy="1661795"/>
           </a:xfrm>
           <a:custGeom>
@@ -18699,7 +18802,7 @@
             </a:pathLst>
           </a:custGeom>
           <a:solidFill>
-            <a:srgbClr val="209078"/>
+            <a:srgbClr val="EA992E"/>
           </a:solidFill>
         </p:spPr>
         <p:txBody>
@@ -18722,8 +18825,8 @@
         </p:nvSpPr>
         <p:spPr>
           <a:xfrm>
-            <a:off x="4597400" y="446176"/>
-            <a:ext cx="5870575" cy="769441"/>
+            <a:off x="-1" y="406400"/>
+            <a:ext cx="13000355" cy="769441"/>
           </a:xfrm>
           <a:prstGeom prst="rect">
             <a:avLst/>
@@ -18735,169 +18838,433 @@
           </a:bodyPr>
           <a:lstStyle/>
           <a:p>
-            <a:pPr marL="12700">
+            <a:pPr marL="12700" algn="ctr">
               <a:lnSpc>
                 <a:spcPts val="5995"/>
               </a:lnSpc>
             </a:pPr>
             <a:r>
-              <a:rPr lang="en-US" spc="-20" dirty="0"/>
-              <a:t>bootstrap</a:t>
-            </a:r>
-            <a:endParaRPr dirty="0"/>
-          </a:p>
-        </p:txBody>
-      </p:sp>
-      <p:sp>
-        <p:nvSpPr>
-          <p:cNvPr id="6" name="object 6"/>
-          <p:cNvSpPr txBox="1"/>
-          <p:nvPr/>
+              <a:rPr lang="en-US" spc="-35" dirty="0"/>
+              <a:t>transformation</a:t>
+            </a:r>
+            <a:endParaRPr spc="-35" dirty="0"/>
+          </a:p>
+        </p:txBody>
+      </p:sp>
+      <p:sp>
+        <p:nvSpPr>
+          <p:cNvPr id="7" name="object 7"/>
+          <p:cNvSpPr txBox="1">
+            <a:spLocks noGrp="1"/>
+          </p:cNvSpPr>
+          <p:nvPr>
+            <p:ph type="body" idx="1"/>
+          </p:nvPr>
         </p:nvSpPr>
         <p:spPr>
           <a:xfrm>
-            <a:off x="1320800" y="2514600"/>
-            <a:ext cx="10690860" cy="3000821"/>
+            <a:off x="1036658" y="1513211"/>
+            <a:ext cx="10266342" cy="7879090"/>
           </a:xfrm>
           <a:prstGeom prst="rect">
             <a:avLst/>
           </a:prstGeom>
         </p:spPr>
         <p:txBody>
-          <a:bodyPr vert="horz" wrap="square" lIns="0" tIns="0" rIns="0" bIns="0" rtlCol="0">
+          <a:bodyPr vert="horz" wrap="square" lIns="0" tIns="1120150" rIns="0" bIns="0" rtlCol="0">
             <a:spAutoFit/>
           </a:bodyPr>
           <a:lstStyle/>
           <a:p>
-            <a:pPr marL="12700" marR="5080">
+            <a:pPr marL="373380" marR="5080"/>
+            <a:r>
+              <a:rPr lang="en-US" sz="3600" spc="-5" dirty="0">
+                <a:latin typeface="Georgia" panose="02040502050405020303" pitchFamily="18" charset="0"/>
+                <a:cs typeface="Consolas"/>
+              </a:rPr>
+              <a:t>The </a:t>
+            </a:r>
+            <a:r>
+              <a:rPr lang="en-US" sz="3600" dirty="0">
+                <a:solidFill>
+                  <a:srgbClr val="FF0000"/>
+                </a:solidFill>
+                <a:latin typeface="Consolas"/>
+                <a:cs typeface="Consolas"/>
+              </a:rPr>
+              <a:t>transform </a:t>
+            </a:r>
+            <a:r>
+              <a:rPr lang="en-US" sz="3600" spc="-5" dirty="0">
+                <a:latin typeface="Georgia" panose="02040502050405020303" pitchFamily="18" charset="0"/>
+                <a:cs typeface="Consolas"/>
+              </a:rPr>
+              <a:t>property lets you manipulate an element by skewing, rotating, moving, or scaling</a:t>
+            </a:r>
+          </a:p>
+          <a:p>
+            <a:pPr marL="373380" marR="5080"/>
+            <a:endParaRPr lang="en-US" sz="3200" spc="-5" dirty="0">
+              <a:latin typeface="Georgia" panose="02040502050405020303" pitchFamily="18" charset="0"/>
+            </a:endParaRPr>
+          </a:p>
+          <a:p>
+            <a:pPr marL="373380" marR="5080"/>
+            <a:r>
+              <a:rPr lang="en-US" sz="3200" spc="-5" dirty="0">
+                <a:latin typeface="Georgia" panose="02040502050405020303" pitchFamily="18" charset="0"/>
+              </a:rPr>
+              <a:t>Like </a:t>
+            </a:r>
+            <a:r>
+              <a:rPr lang="en-US" sz="3200" dirty="0">
+                <a:solidFill>
+                  <a:srgbClr val="FF0000"/>
+                </a:solidFill>
+                <a:latin typeface="Consolas"/>
+                <a:cs typeface="Consolas"/>
+              </a:rPr>
+              <a:t>filter</a:t>
+            </a:r>
+            <a:r>
+              <a:rPr lang="en-US" sz="3200" spc="-5" dirty="0">
+                <a:latin typeface="Georgia" panose="02040502050405020303" pitchFamily="18" charset="0"/>
+                <a:cs typeface="Consolas"/>
+              </a:rPr>
+              <a:t>, the value is the type of transformation you want to apply, with the degree of transformation in parenthesis</a:t>
+            </a:r>
+            <a:endParaRPr lang="en-US" sz="3200" spc="-5" dirty="0">
+              <a:latin typeface="Georgia" panose="02040502050405020303" pitchFamily="18" charset="0"/>
+            </a:endParaRPr>
+          </a:p>
+          <a:p>
+            <a:pPr marL="373380" marR="5080"/>
+            <a:endParaRPr lang="en-US" sz="3200" spc="-5" dirty="0">
+              <a:latin typeface="Georgia" panose="02040502050405020303" pitchFamily="18" charset="0"/>
+            </a:endParaRPr>
+          </a:p>
+          <a:p>
+            <a:pPr marL="373380" marR="5080"/>
+            <a:endParaRPr lang="en-US" sz="1050" dirty="0">
+              <a:solidFill>
+                <a:srgbClr val="FF0000"/>
+              </a:solidFill>
+              <a:latin typeface="Consolas"/>
+              <a:cs typeface="Consolas"/>
+            </a:endParaRPr>
+          </a:p>
+          <a:p>
+            <a:pPr marL="373380" marR="5080"/>
+            <a:r>
+              <a:rPr lang="en-US" sz="3200" dirty="0">
+                <a:solidFill>
+                  <a:srgbClr val="7F007F"/>
+                </a:solidFill>
+                <a:latin typeface="Consolas"/>
+                <a:cs typeface="Consolas"/>
+              </a:rPr>
+              <a:t>.bigger </a:t>
+            </a:r>
+            <a:r>
+              <a:rPr lang="en-US" sz="3200" dirty="0">
+                <a:solidFill>
+                  <a:srgbClr val="0000FF"/>
+                </a:solidFill>
+                <a:latin typeface="Consolas"/>
+                <a:cs typeface="Consolas"/>
+              </a:rPr>
+              <a:t>{</a:t>
+            </a:r>
+            <a:r>
+              <a:rPr lang="en-US" sz="3200" dirty="0">
+                <a:solidFill>
+                  <a:prstClr val="black"/>
+                </a:solidFill>
+                <a:latin typeface="Consolas" panose="020B0609020204030204" pitchFamily="49" charset="0"/>
+                <a:cs typeface="Courier New"/>
+              </a:rPr>
+              <a:t> </a:t>
+            </a:r>
+          </a:p>
+          <a:p>
+            <a:pPr marL="373380" marR="5080"/>
+            <a:r>
+              <a:rPr lang="en-US" sz="3200" dirty="0">
+                <a:solidFill>
+                  <a:srgbClr val="FF0000"/>
+                </a:solidFill>
+                <a:latin typeface="Consolas"/>
+                <a:cs typeface="Consolas"/>
+              </a:rPr>
+              <a:t>	transform</a:t>
+            </a:r>
+            <a:r>
+              <a:rPr lang="en-US" sz="3200" dirty="0">
+                <a:solidFill>
+                  <a:srgbClr val="0000FF"/>
+                </a:solidFill>
+                <a:latin typeface="Consolas"/>
+                <a:cs typeface="Consolas"/>
+              </a:rPr>
+              <a:t>: scale(20);</a:t>
+            </a:r>
+            <a:endParaRPr lang="en-US" sz="3200" dirty="0">
+              <a:solidFill>
+                <a:prstClr val="black"/>
+              </a:solidFill>
+              <a:latin typeface="Consolas" panose="020B0609020204030204" pitchFamily="49" charset="0"/>
+              <a:cs typeface="Courier New"/>
+            </a:endParaRPr>
+          </a:p>
+          <a:p>
+            <a:pPr marL="373380" marR="5080"/>
+            <a:r>
+              <a:rPr lang="en-US" sz="3200" dirty="0">
+                <a:solidFill>
+                  <a:srgbClr val="0000FF"/>
+                </a:solidFill>
+                <a:latin typeface="Consolas"/>
+                <a:cs typeface="Consolas"/>
+              </a:rPr>
+              <a:t>}</a:t>
+            </a:r>
+          </a:p>
+          <a:p>
+            <a:pPr marL="373380" marR="5080"/>
+            <a:endParaRPr lang="en-US" sz="3600" spc="-5" dirty="0">
+              <a:latin typeface="Georgia" panose="02040502050405020303" pitchFamily="18" charset="0"/>
+            </a:endParaRPr>
+          </a:p>
+          <a:p>
+            <a:pPr marL="373380" marR="5080"/>
+            <a:endParaRPr lang="en-US" sz="3200" spc="-5" dirty="0">
+              <a:latin typeface="Georgia" panose="02040502050405020303" pitchFamily="18" charset="0"/>
+            </a:endParaRPr>
+          </a:p>
+          <a:p>
+            <a:pPr marL="373380" marR="5080"/>
+            <a:endParaRPr sz="3200" spc="-10" dirty="0">
+              <a:latin typeface="Georgia" panose="02040502050405020303" pitchFamily="18" charset="0"/>
+            </a:endParaRPr>
+          </a:p>
+        </p:txBody>
+      </p:sp>
+      <p:sp>
+        <p:nvSpPr>
+          <p:cNvPr id="11" name="Rectangle 3">
+            <a:extLst>
+              <a:ext uri="{FF2B5EF4-FFF2-40B4-BE49-F238E27FC236}">
+                <a16:creationId xmlns:a16="http://schemas.microsoft.com/office/drawing/2014/main" id="{0A7FCAC4-174B-4F52-A56F-53275091B4D5}"/>
+              </a:ext>
+            </a:extLst>
+          </p:cNvPr>
+          <p:cNvSpPr>
+            <a:spLocks noChangeArrowheads="1"/>
+          </p:cNvSpPr>
+          <p:nvPr/>
+        </p:nvSpPr>
+        <p:spPr bwMode="auto">
+          <a:xfrm>
+            <a:off x="304800" y="471844"/>
+            <a:ext cx="22442" cy="123111"/>
+          </a:xfrm>
+          <a:prstGeom prst="rect">
+            <a:avLst/>
+          </a:prstGeom>
+          <a:noFill/>
+          <a:ln>
+            <a:noFill/>
+          </a:ln>
+          <a:effectLst/>
+          <a:extLst>
+            <a:ext uri="{909E8E84-426E-40DD-AFC4-6F175D3DCCD1}">
+              <a14:hiddenFill xmlns:a14="http://schemas.microsoft.com/office/drawing/2010/main">
+                <a:solidFill>
+                  <a:schemeClr val="accent1"/>
+                </a:solidFill>
+              </a14:hiddenFill>
+            </a:ext>
+            <a:ext uri="{91240B29-F687-4F45-9708-019B960494DF}">
+              <a14:hiddenLine xmlns:a14="http://schemas.microsoft.com/office/drawing/2010/main" w="9525">
+                <a:solidFill>
+                  <a:schemeClr val="tx1"/>
+                </a:solidFill>
+                <a:miter lim="800000"/>
+                <a:headEnd/>
+                <a:tailEnd/>
+              </a14:hiddenLine>
+            </a:ext>
+            <a:ext uri="{AF507438-7753-43E0-B8FC-AC1667EBCBE1}">
+              <a14:hiddenEffects xmlns:a14="http://schemas.microsoft.com/office/drawing/2010/main">
+                <a:effectLst>
+                  <a:outerShdw dist="35921" dir="2700000" algn="ctr" rotWithShape="0">
+                    <a:schemeClr val="bg2"/>
+                  </a:outerShdw>
+                </a:effectLst>
+              </a14:hiddenEffects>
+            </a:ext>
+          </a:extLst>
+        </p:spPr>
+        <p:txBody>
+          <a:bodyPr vert="horz" wrap="none" lIns="0" tIns="0" rIns="0" bIns="0" numCol="1" anchor="ctr" anchorCtr="0" compatLnSpc="1">
+            <a:prstTxWarp prst="textNoShape">
+              <a:avLst/>
+            </a:prstTxWarp>
+            <a:spAutoFit/>
+          </a:bodyPr>
+          <a:lstStyle/>
+          <a:p>
+            <a:pPr marL="0" marR="0" lvl="0" indent="0" algn="l" defTabSz="914400" rtl="0" eaLnBrk="0" fontAlgn="base" latinLnBrk="0" hangingPunct="0">
+              <a:lnSpc>
+                <a:spcPct val="100000"/>
+              </a:lnSpc>
               <a:spcBef>
-                <a:spcPts val="1550"/>
+                <a:spcPct val="0"/>
               </a:spcBef>
-            </a:pPr>
-            <a:r>
-              <a:rPr lang="en-US" sz="3100" b="1" spc="45" dirty="0">
-                <a:solidFill>
-                  <a:srgbClr val="5F5F5F"/>
-                </a:solidFill>
-                <a:latin typeface="Georgia" panose="02040502050405020303" pitchFamily="18" charset="0"/>
-                <a:cs typeface="Lora"/>
-              </a:rPr>
-              <a:t>Bootstrap</a:t>
-            </a:r>
-            <a:r>
-              <a:rPr sz="3100" b="1" spc="45" dirty="0">
-                <a:solidFill>
-                  <a:srgbClr val="5F5F5F"/>
-                </a:solidFill>
-                <a:latin typeface="Georgia" panose="02040502050405020303" pitchFamily="18" charset="0"/>
-                <a:cs typeface="Lora"/>
+              <a:spcAft>
+                <a:spcPct val="0"/>
+              </a:spcAft>
+              <a:buClrTx/>
+              <a:buSzTx/>
+              <a:buFontTx/>
+              <a:buNone/>
+              <a:tabLst/>
+            </a:pPr>
+            <a:r>
+              <a:rPr kumimoji="0" lang="en-US" altLang="en-US" sz="800" b="0" i="0" u="none" strike="noStrike" cap="none" normalizeH="0" baseline="0" dirty="0">
+                <a:ln>
+                  <a:noFill/>
+                </a:ln>
+                <a:solidFill>
+                  <a:schemeClr val="tx1"/>
+                </a:solidFill>
+                <a:effectLst/>
               </a:rPr>
               <a:t> </a:t>
             </a:r>
-            <a:r>
-              <a:rPr sz="3100" dirty="0">
-                <a:solidFill>
-                  <a:srgbClr val="5F5F5F"/>
-                </a:solidFill>
-                <a:latin typeface="Georgia" panose="02040502050405020303" pitchFamily="18" charset="0"/>
-                <a:cs typeface="Lora"/>
-              </a:rPr>
-              <a:t>is a </a:t>
-            </a:r>
-            <a:r>
-              <a:rPr lang="en-US" sz="3100" spc="-5" dirty="0">
-                <a:solidFill>
-                  <a:srgbClr val="5F5F5F"/>
-                </a:solidFill>
-                <a:latin typeface="Georgia" panose="02040502050405020303" pitchFamily="18" charset="0"/>
-                <a:cs typeface="Lora"/>
-              </a:rPr>
-              <a:t>CSS library you can import into a project to quickly provide some base styles for your project.</a:t>
-            </a:r>
-          </a:p>
-          <a:p>
-            <a:pPr marL="12700" marR="5080">
+            <a:endParaRPr kumimoji="0" lang="en-US" altLang="en-US" sz="1800" b="0" i="0" u="none" strike="noStrike" cap="none" normalizeH="0" baseline="0" dirty="0">
+              <a:ln>
+                <a:noFill/>
+              </a:ln>
+              <a:solidFill>
+                <a:schemeClr val="tx1"/>
+              </a:solidFill>
+              <a:effectLst/>
+              <a:latin typeface="Arial" panose="020B0604020202020204" pitchFamily="34" charset="0"/>
+            </a:endParaRPr>
+          </a:p>
+        </p:txBody>
+      </p:sp>
+      <p:sp>
+        <p:nvSpPr>
+          <p:cNvPr id="12" name="Rectangle 4">
+            <a:extLst>
+              <a:ext uri="{FF2B5EF4-FFF2-40B4-BE49-F238E27FC236}">
+                <a16:creationId xmlns:a16="http://schemas.microsoft.com/office/drawing/2014/main" id="{DA2A0CCA-462A-4823-8FFB-ABDA49F0516F}"/>
+              </a:ext>
+            </a:extLst>
+          </p:cNvPr>
+          <p:cNvSpPr>
+            <a:spLocks noChangeArrowheads="1"/>
+          </p:cNvSpPr>
+          <p:nvPr/>
+        </p:nvSpPr>
+        <p:spPr bwMode="auto">
+          <a:xfrm>
+            <a:off x="457200" y="624244"/>
+            <a:ext cx="22442" cy="123111"/>
+          </a:xfrm>
+          <a:prstGeom prst="rect">
+            <a:avLst/>
+          </a:prstGeom>
+          <a:noFill/>
+          <a:ln>
+            <a:noFill/>
+          </a:ln>
+          <a:effectLst/>
+          <a:extLst>
+            <a:ext uri="{909E8E84-426E-40DD-AFC4-6F175D3DCCD1}">
+              <a14:hiddenFill xmlns:a14="http://schemas.microsoft.com/office/drawing/2010/main">
+                <a:solidFill>
+                  <a:schemeClr val="accent1"/>
+                </a:solidFill>
+              </a14:hiddenFill>
+            </a:ext>
+            <a:ext uri="{91240B29-F687-4F45-9708-019B960494DF}">
+              <a14:hiddenLine xmlns:a14="http://schemas.microsoft.com/office/drawing/2010/main" w="9525">
+                <a:solidFill>
+                  <a:schemeClr val="tx1"/>
+                </a:solidFill>
+                <a:miter lim="800000"/>
+                <a:headEnd/>
+                <a:tailEnd/>
+              </a14:hiddenLine>
+            </a:ext>
+            <a:ext uri="{AF507438-7753-43E0-B8FC-AC1667EBCBE1}">
+              <a14:hiddenEffects xmlns:a14="http://schemas.microsoft.com/office/drawing/2010/main">
+                <a:effectLst>
+                  <a:outerShdw dist="35921" dir="2700000" algn="ctr" rotWithShape="0">
+                    <a:schemeClr val="bg2"/>
+                  </a:outerShdw>
+                </a:effectLst>
+              </a14:hiddenEffects>
+            </a:ext>
+          </a:extLst>
+        </p:spPr>
+        <p:txBody>
+          <a:bodyPr vert="horz" wrap="none" lIns="0" tIns="0" rIns="0" bIns="0" numCol="1" anchor="ctr" anchorCtr="0" compatLnSpc="1">
+            <a:prstTxWarp prst="textNoShape">
+              <a:avLst/>
+            </a:prstTxWarp>
+            <a:spAutoFit/>
+          </a:bodyPr>
+          <a:lstStyle/>
+          <a:p>
+            <a:pPr marL="0" marR="0" lvl="0" indent="0" algn="l" defTabSz="914400" rtl="0" eaLnBrk="0" fontAlgn="base" latinLnBrk="0" hangingPunct="0">
+              <a:lnSpc>
+                <a:spcPct val="100000"/>
+              </a:lnSpc>
               <a:spcBef>
-                <a:spcPts val="1550"/>
+                <a:spcPct val="0"/>
               </a:spcBef>
-            </a:pPr>
-            <a:endParaRPr lang="en-US" sz="3100" spc="-5" dirty="0">
+              <a:spcAft>
+                <a:spcPct val="0"/>
+              </a:spcAft>
+              <a:buClrTx/>
+              <a:buSzTx/>
+              <a:buFontTx/>
+              <a:buNone/>
+              <a:tabLst/>
+            </a:pPr>
+            <a:r>
+              <a:rPr kumimoji="0" lang="en-US" altLang="en-US" sz="800" b="0" i="0" u="none" strike="noStrike" cap="none" normalizeH="0" baseline="0" dirty="0">
+                <a:ln>
+                  <a:noFill/>
+                </a:ln>
+                <a:solidFill>
+                  <a:schemeClr val="tx1"/>
+                </a:solidFill>
+                <a:effectLst/>
+              </a:rPr>
+              <a:t> </a:t>
+            </a:r>
+            <a:endParaRPr kumimoji="0" lang="en-US" altLang="en-US" sz="1800" b="0" i="0" u="none" strike="noStrike" cap="none" normalizeH="0" baseline="0" dirty="0">
+              <a:ln>
+                <a:noFill/>
+              </a:ln>
               <a:solidFill>
-                <a:srgbClr val="5F5F5F"/>
+                <a:schemeClr val="tx1"/>
               </a:solidFill>
-              <a:latin typeface="Georgia" panose="02040502050405020303" pitchFamily="18" charset="0"/>
-              <a:cs typeface="Lora"/>
-            </a:endParaRPr>
-          </a:p>
-          <a:p>
-            <a:pPr marL="12700" marR="5080">
-              <a:spcBef>
-                <a:spcPts val="1550"/>
-              </a:spcBef>
-            </a:pPr>
-            <a:r>
-              <a:rPr lang="en-US" sz="3100" spc="-10" dirty="0">
-                <a:solidFill>
-                  <a:srgbClr val="5F5F5F"/>
-                </a:solidFill>
-                <a:latin typeface="Georgia" panose="02040502050405020303" pitchFamily="18" charset="0"/>
-                <a:cs typeface="Lora"/>
-                <a:hlinkClick r:id="rId2"/>
-              </a:rPr>
-              <a:t>http://getbootstrap.com/getting-started/</a:t>
-            </a:r>
-            <a:endParaRPr lang="en-US" sz="3100" spc="-10" dirty="0">
-              <a:solidFill>
-                <a:srgbClr val="5F5F5F"/>
-              </a:solidFill>
-              <a:latin typeface="Georgia" panose="02040502050405020303" pitchFamily="18" charset="0"/>
-              <a:cs typeface="Lora"/>
-            </a:endParaRPr>
-          </a:p>
-          <a:p>
-            <a:pPr marL="12700" marR="5080">
-              <a:spcBef>
-                <a:spcPts val="1550"/>
-              </a:spcBef>
-            </a:pPr>
-            <a:endParaRPr lang="en-US" sz="3100" spc="-10" dirty="0">
-              <a:solidFill>
-                <a:srgbClr val="5F5F5F"/>
-              </a:solidFill>
-              <a:latin typeface="Georgia" panose="02040502050405020303" pitchFamily="18" charset="0"/>
-              <a:cs typeface="Lora"/>
-            </a:endParaRPr>
-          </a:p>
-        </p:txBody>
-      </p:sp>
-      <p:pic>
-        <p:nvPicPr>
-          <p:cNvPr id="7" name="Picture 6"/>
-          <p:cNvPicPr>
-            <a:picLocks noChangeAspect="1"/>
-          </p:cNvPicPr>
-          <p:nvPr/>
-        </p:nvPicPr>
-        <p:blipFill>
-          <a:blip r:embed="rId3"/>
-          <a:stretch>
-            <a:fillRect/>
-          </a:stretch>
-        </p:blipFill>
-        <p:spPr>
-          <a:xfrm>
-            <a:off x="1320800" y="5562600"/>
-            <a:ext cx="8991600" cy="3367173"/>
-          </a:xfrm>
-          <a:prstGeom prst="rect">
-            <a:avLst/>
-          </a:prstGeom>
-        </p:spPr>
-      </p:pic>
+              <a:effectLst/>
+              <a:latin typeface="Arial" panose="020B0604020202020204" pitchFamily="34" charset="0"/>
+            </a:endParaRPr>
+          </a:p>
+        </p:txBody>
+      </p:sp>
     </p:spTree>
     <p:extLst>
       <p:ext uri="{BB962C8B-B14F-4D97-AF65-F5344CB8AC3E}">
-        <p14:creationId xmlns:p14="http://schemas.microsoft.com/office/powerpoint/2010/main" val="1542566363"/>
+        <p14:creationId xmlns:p14="http://schemas.microsoft.com/office/powerpoint/2010/main" val="863790251"/>
       </p:ext>
     </p:extLst>
   </p:cSld>
@@ -18926,13 +19293,13 @@
       </p:grpSpPr>
       <p:sp>
         <p:nvSpPr>
-          <p:cNvPr id="2" name="object 2"/>
+          <p:cNvPr id="6" name="object 2"/>
           <p:cNvSpPr/>
           <p:nvPr/>
         </p:nvSpPr>
         <p:spPr>
           <a:xfrm>
-            <a:off x="-20983" y="0"/>
+            <a:off x="-4445" y="0"/>
             <a:ext cx="13004800" cy="1661795"/>
           </a:xfrm>
           <a:custGeom>
@@ -18963,7 +19330,1186 @@
             </a:pathLst>
           </a:custGeom>
           <a:solidFill>
-            <a:srgbClr val="209078"/>
+            <a:srgbClr val="EA992E"/>
+          </a:solidFill>
+        </p:spPr>
+        <p:txBody>
+          <a:bodyPr wrap="square" lIns="0" tIns="0" rIns="0" bIns="0" rtlCol="0"/>
+          <a:lstStyle/>
+          <a:p>
+            <a:endParaRPr/>
+          </a:p>
+        </p:txBody>
+      </p:sp>
+      <p:sp>
+        <p:nvSpPr>
+          <p:cNvPr id="3" name="object 3"/>
+          <p:cNvSpPr txBox="1">
+            <a:spLocks noGrp="1"/>
+          </p:cNvSpPr>
+          <p:nvPr>
+            <p:ph type="title"/>
+          </p:nvPr>
+        </p:nvSpPr>
+        <p:spPr>
+          <a:xfrm>
+            <a:off x="-1" y="406400"/>
+            <a:ext cx="13000355" cy="769441"/>
+          </a:xfrm>
+          <a:prstGeom prst="rect">
+            <a:avLst/>
+          </a:prstGeom>
+        </p:spPr>
+        <p:txBody>
+          <a:bodyPr vert="horz" wrap="square" lIns="0" tIns="0" rIns="0" bIns="0" rtlCol="0">
+            <a:spAutoFit/>
+          </a:bodyPr>
+          <a:lstStyle/>
+          <a:p>
+            <a:pPr marL="12700" algn="ctr">
+              <a:lnSpc>
+                <a:spcPts val="5995"/>
+              </a:lnSpc>
+            </a:pPr>
+            <a:r>
+              <a:rPr lang="en-US" spc="-35" dirty="0"/>
+              <a:t>transformation</a:t>
+            </a:r>
+            <a:endParaRPr spc="-35" dirty="0"/>
+          </a:p>
+        </p:txBody>
+      </p:sp>
+      <p:sp>
+        <p:nvSpPr>
+          <p:cNvPr id="7" name="object 7"/>
+          <p:cNvSpPr txBox="1">
+            <a:spLocks noGrp="1"/>
+          </p:cNvSpPr>
+          <p:nvPr>
+            <p:ph type="body" idx="1"/>
+          </p:nvPr>
+        </p:nvSpPr>
+        <p:spPr>
+          <a:xfrm>
+            <a:off x="1036658" y="1513211"/>
+            <a:ext cx="10266342" cy="2769999"/>
+          </a:xfrm>
+          <a:prstGeom prst="rect">
+            <a:avLst/>
+          </a:prstGeom>
+        </p:spPr>
+        <p:txBody>
+          <a:bodyPr vert="horz" wrap="square" lIns="0" tIns="1120150" rIns="0" bIns="0" rtlCol="0">
+            <a:spAutoFit/>
+          </a:bodyPr>
+          <a:lstStyle/>
+          <a:p>
+            <a:pPr marL="373380" marR="5080"/>
+            <a:endParaRPr lang="en-US" sz="3200" spc="-5" dirty="0">
+              <a:latin typeface="Georgia" panose="02040502050405020303" pitchFamily="18" charset="0"/>
+            </a:endParaRPr>
+          </a:p>
+          <a:p>
+            <a:pPr marL="373380" marR="5080"/>
+            <a:endParaRPr lang="en-US" sz="1050" dirty="0">
+              <a:solidFill>
+                <a:srgbClr val="FF0000"/>
+              </a:solidFill>
+              <a:latin typeface="Consolas"/>
+              <a:cs typeface="Consolas"/>
+            </a:endParaRPr>
+          </a:p>
+          <a:p>
+            <a:pPr marL="373380" marR="5080"/>
+            <a:endParaRPr lang="en-US" sz="3200" spc="-5" dirty="0">
+              <a:latin typeface="Georgia" panose="02040502050405020303" pitchFamily="18" charset="0"/>
+            </a:endParaRPr>
+          </a:p>
+          <a:p>
+            <a:pPr marL="373380" marR="5080"/>
+            <a:endParaRPr sz="3200" spc="-10" dirty="0">
+              <a:latin typeface="Georgia" panose="02040502050405020303" pitchFamily="18" charset="0"/>
+            </a:endParaRPr>
+          </a:p>
+        </p:txBody>
+      </p:sp>
+      <p:sp>
+        <p:nvSpPr>
+          <p:cNvPr id="11" name="Rectangle 3">
+            <a:extLst>
+              <a:ext uri="{FF2B5EF4-FFF2-40B4-BE49-F238E27FC236}">
+                <a16:creationId xmlns:a16="http://schemas.microsoft.com/office/drawing/2014/main" id="{0A7FCAC4-174B-4F52-A56F-53275091B4D5}"/>
+              </a:ext>
+            </a:extLst>
+          </p:cNvPr>
+          <p:cNvSpPr>
+            <a:spLocks noChangeArrowheads="1"/>
+          </p:cNvSpPr>
+          <p:nvPr/>
+        </p:nvSpPr>
+        <p:spPr bwMode="auto">
+          <a:xfrm>
+            <a:off x="304800" y="471844"/>
+            <a:ext cx="22442" cy="123111"/>
+          </a:xfrm>
+          <a:prstGeom prst="rect">
+            <a:avLst/>
+          </a:prstGeom>
+          <a:noFill/>
+          <a:ln>
+            <a:noFill/>
+          </a:ln>
+          <a:effectLst/>
+          <a:extLst>
+            <a:ext uri="{909E8E84-426E-40DD-AFC4-6F175D3DCCD1}">
+              <a14:hiddenFill xmlns:a14="http://schemas.microsoft.com/office/drawing/2010/main">
+                <a:solidFill>
+                  <a:schemeClr val="accent1"/>
+                </a:solidFill>
+              </a14:hiddenFill>
+            </a:ext>
+            <a:ext uri="{91240B29-F687-4F45-9708-019B960494DF}">
+              <a14:hiddenLine xmlns:a14="http://schemas.microsoft.com/office/drawing/2010/main" w="9525">
+                <a:solidFill>
+                  <a:schemeClr val="tx1"/>
+                </a:solidFill>
+                <a:miter lim="800000"/>
+                <a:headEnd/>
+                <a:tailEnd/>
+              </a14:hiddenLine>
+            </a:ext>
+            <a:ext uri="{AF507438-7753-43E0-B8FC-AC1667EBCBE1}">
+              <a14:hiddenEffects xmlns:a14="http://schemas.microsoft.com/office/drawing/2010/main">
+                <a:effectLst>
+                  <a:outerShdw dist="35921" dir="2700000" algn="ctr" rotWithShape="0">
+                    <a:schemeClr val="bg2"/>
+                  </a:outerShdw>
+                </a:effectLst>
+              </a14:hiddenEffects>
+            </a:ext>
+          </a:extLst>
+        </p:spPr>
+        <p:txBody>
+          <a:bodyPr vert="horz" wrap="none" lIns="0" tIns="0" rIns="0" bIns="0" numCol="1" anchor="ctr" anchorCtr="0" compatLnSpc="1">
+            <a:prstTxWarp prst="textNoShape">
+              <a:avLst/>
+            </a:prstTxWarp>
+            <a:spAutoFit/>
+          </a:bodyPr>
+          <a:lstStyle/>
+          <a:p>
+            <a:pPr marL="0" marR="0" lvl="0" indent="0" algn="l" defTabSz="914400" rtl="0" eaLnBrk="0" fontAlgn="base" latinLnBrk="0" hangingPunct="0">
+              <a:lnSpc>
+                <a:spcPct val="100000"/>
+              </a:lnSpc>
+              <a:spcBef>
+                <a:spcPct val="0"/>
+              </a:spcBef>
+              <a:spcAft>
+                <a:spcPct val="0"/>
+              </a:spcAft>
+              <a:buClrTx/>
+              <a:buSzTx/>
+              <a:buFontTx/>
+              <a:buNone/>
+              <a:tabLst/>
+            </a:pPr>
+            <a:r>
+              <a:rPr kumimoji="0" lang="en-US" altLang="en-US" sz="800" b="0" i="0" u="none" strike="noStrike" cap="none" normalizeH="0" baseline="0" dirty="0">
+                <a:ln>
+                  <a:noFill/>
+                </a:ln>
+                <a:solidFill>
+                  <a:schemeClr val="tx1"/>
+                </a:solidFill>
+                <a:effectLst/>
+              </a:rPr>
+              <a:t> </a:t>
+            </a:r>
+            <a:endParaRPr kumimoji="0" lang="en-US" altLang="en-US" sz="1800" b="0" i="0" u="none" strike="noStrike" cap="none" normalizeH="0" baseline="0" dirty="0">
+              <a:ln>
+                <a:noFill/>
+              </a:ln>
+              <a:solidFill>
+                <a:schemeClr val="tx1"/>
+              </a:solidFill>
+              <a:effectLst/>
+              <a:latin typeface="Arial" panose="020B0604020202020204" pitchFamily="34" charset="0"/>
+            </a:endParaRPr>
+          </a:p>
+        </p:txBody>
+      </p:sp>
+      <p:sp>
+        <p:nvSpPr>
+          <p:cNvPr id="12" name="Rectangle 4">
+            <a:extLst>
+              <a:ext uri="{FF2B5EF4-FFF2-40B4-BE49-F238E27FC236}">
+                <a16:creationId xmlns:a16="http://schemas.microsoft.com/office/drawing/2014/main" id="{DA2A0CCA-462A-4823-8FFB-ABDA49F0516F}"/>
+              </a:ext>
+            </a:extLst>
+          </p:cNvPr>
+          <p:cNvSpPr>
+            <a:spLocks noChangeArrowheads="1"/>
+          </p:cNvSpPr>
+          <p:nvPr/>
+        </p:nvSpPr>
+        <p:spPr bwMode="auto">
+          <a:xfrm>
+            <a:off x="457200" y="624244"/>
+            <a:ext cx="22442" cy="123111"/>
+          </a:xfrm>
+          <a:prstGeom prst="rect">
+            <a:avLst/>
+          </a:prstGeom>
+          <a:noFill/>
+          <a:ln>
+            <a:noFill/>
+          </a:ln>
+          <a:effectLst/>
+          <a:extLst>
+            <a:ext uri="{909E8E84-426E-40DD-AFC4-6F175D3DCCD1}">
+              <a14:hiddenFill xmlns:a14="http://schemas.microsoft.com/office/drawing/2010/main">
+                <a:solidFill>
+                  <a:schemeClr val="accent1"/>
+                </a:solidFill>
+              </a14:hiddenFill>
+            </a:ext>
+            <a:ext uri="{91240B29-F687-4F45-9708-019B960494DF}">
+              <a14:hiddenLine xmlns:a14="http://schemas.microsoft.com/office/drawing/2010/main" w="9525">
+                <a:solidFill>
+                  <a:schemeClr val="tx1"/>
+                </a:solidFill>
+                <a:miter lim="800000"/>
+                <a:headEnd/>
+                <a:tailEnd/>
+              </a14:hiddenLine>
+            </a:ext>
+            <a:ext uri="{AF507438-7753-43E0-B8FC-AC1667EBCBE1}">
+              <a14:hiddenEffects xmlns:a14="http://schemas.microsoft.com/office/drawing/2010/main">
+                <a:effectLst>
+                  <a:outerShdw dist="35921" dir="2700000" algn="ctr" rotWithShape="0">
+                    <a:schemeClr val="bg2"/>
+                  </a:outerShdw>
+                </a:effectLst>
+              </a14:hiddenEffects>
+            </a:ext>
+          </a:extLst>
+        </p:spPr>
+        <p:txBody>
+          <a:bodyPr vert="horz" wrap="none" lIns="0" tIns="0" rIns="0" bIns="0" numCol="1" anchor="ctr" anchorCtr="0" compatLnSpc="1">
+            <a:prstTxWarp prst="textNoShape">
+              <a:avLst/>
+            </a:prstTxWarp>
+            <a:spAutoFit/>
+          </a:bodyPr>
+          <a:lstStyle/>
+          <a:p>
+            <a:pPr marL="0" marR="0" lvl="0" indent="0" algn="l" defTabSz="914400" rtl="0" eaLnBrk="0" fontAlgn="base" latinLnBrk="0" hangingPunct="0">
+              <a:lnSpc>
+                <a:spcPct val="100000"/>
+              </a:lnSpc>
+              <a:spcBef>
+                <a:spcPct val="0"/>
+              </a:spcBef>
+              <a:spcAft>
+                <a:spcPct val="0"/>
+              </a:spcAft>
+              <a:buClrTx/>
+              <a:buSzTx/>
+              <a:buFontTx/>
+              <a:buNone/>
+              <a:tabLst/>
+            </a:pPr>
+            <a:r>
+              <a:rPr kumimoji="0" lang="en-US" altLang="en-US" sz="800" b="0" i="0" u="none" strike="noStrike" cap="none" normalizeH="0" baseline="0" dirty="0">
+                <a:ln>
+                  <a:noFill/>
+                </a:ln>
+                <a:solidFill>
+                  <a:schemeClr val="tx1"/>
+                </a:solidFill>
+                <a:effectLst/>
+              </a:rPr>
+              <a:t> </a:t>
+            </a:r>
+            <a:endParaRPr kumimoji="0" lang="en-US" altLang="en-US" sz="1800" b="0" i="0" u="none" strike="noStrike" cap="none" normalizeH="0" baseline="0" dirty="0">
+              <a:ln>
+                <a:noFill/>
+              </a:ln>
+              <a:solidFill>
+                <a:schemeClr val="tx1"/>
+              </a:solidFill>
+              <a:effectLst/>
+              <a:latin typeface="Arial" panose="020B0604020202020204" pitchFamily="34" charset="0"/>
+            </a:endParaRPr>
+          </a:p>
+        </p:txBody>
+      </p:sp>
+      <p:sp>
+        <p:nvSpPr>
+          <p:cNvPr id="4" name="Rectangle 3">
+            <a:extLst>
+              <a:ext uri="{FF2B5EF4-FFF2-40B4-BE49-F238E27FC236}">
+                <a16:creationId xmlns:a16="http://schemas.microsoft.com/office/drawing/2014/main" id="{967B3B33-97A9-4592-B98A-516066A02678}"/>
+              </a:ext>
+            </a:extLst>
+          </p:cNvPr>
+          <p:cNvSpPr/>
+          <p:nvPr/>
+        </p:nvSpPr>
+        <p:spPr>
+          <a:xfrm>
+            <a:off x="1559728" y="2514600"/>
+            <a:ext cx="10352871" cy="6370975"/>
+          </a:xfrm>
+          <a:prstGeom prst="rect">
+            <a:avLst/>
+          </a:prstGeom>
+        </p:spPr>
+        <p:txBody>
+          <a:bodyPr wrap="square">
+            <a:spAutoFit/>
+          </a:bodyPr>
+          <a:lstStyle/>
+          <a:p>
+            <a:pPr marL="373380" marR="5080" lvl="0">
+              <a:defRPr/>
+            </a:pPr>
+            <a:r>
+              <a:rPr lang="en-US" sz="3600" kern="0" spc="-5" dirty="0">
+                <a:solidFill>
+                  <a:srgbClr val="5F5F5F"/>
+                </a:solidFill>
+                <a:latin typeface="Georgia" panose="02040502050405020303" pitchFamily="18" charset="0"/>
+                <a:cs typeface="Consolas"/>
+              </a:rPr>
+              <a:t>Potential uses:</a:t>
+            </a:r>
+          </a:p>
+          <a:p>
+            <a:pPr marL="373380" marR="5080" lvl="0">
+              <a:defRPr/>
+            </a:pPr>
+            <a:endParaRPr lang="en-US" sz="3600" kern="0" spc="-5" dirty="0">
+              <a:solidFill>
+                <a:srgbClr val="5F5F5F"/>
+              </a:solidFill>
+              <a:latin typeface="Georgia" panose="02040502050405020303" pitchFamily="18" charset="0"/>
+              <a:cs typeface="Consolas"/>
+            </a:endParaRPr>
+          </a:p>
+          <a:p>
+            <a:pPr marL="944880" marR="5080" lvl="0" indent="-571500">
+              <a:buFont typeface="Arial" panose="020B0604020202020204" pitchFamily="34" charset="0"/>
+              <a:buChar char="•"/>
+              <a:defRPr/>
+            </a:pPr>
+            <a:r>
+              <a:rPr lang="en-US" sz="3600" kern="0" spc="-5" dirty="0">
+                <a:solidFill>
+                  <a:srgbClr val="5F5F5F"/>
+                </a:solidFill>
+                <a:latin typeface="Georgia" panose="02040502050405020303" pitchFamily="18" charset="0"/>
+                <a:cs typeface="Consolas"/>
+              </a:rPr>
+              <a:t>Flip an arrow when sorting or expanding a menu</a:t>
+            </a:r>
+          </a:p>
+          <a:p>
+            <a:pPr marL="373380" marR="5080" lvl="0">
+              <a:defRPr/>
+            </a:pPr>
+            <a:endParaRPr lang="en-US" sz="3600" kern="0" spc="-5" dirty="0">
+              <a:solidFill>
+                <a:srgbClr val="5F5F5F"/>
+              </a:solidFill>
+              <a:latin typeface="Georgia" panose="02040502050405020303" pitchFamily="18" charset="0"/>
+              <a:cs typeface="Consolas"/>
+            </a:endParaRPr>
+          </a:p>
+          <a:p>
+            <a:pPr marL="373380" marR="5080" lvl="0">
+              <a:defRPr/>
+            </a:pPr>
+            <a:endParaRPr lang="en-US" sz="3600" kern="0" spc="-5" dirty="0">
+              <a:solidFill>
+                <a:srgbClr val="5F5F5F"/>
+              </a:solidFill>
+              <a:latin typeface="Georgia" panose="02040502050405020303" pitchFamily="18" charset="0"/>
+              <a:cs typeface="Consolas"/>
+            </a:endParaRPr>
+          </a:p>
+          <a:p>
+            <a:pPr marL="373380" marR="5080"/>
+            <a:r>
+              <a:rPr lang="en-US" sz="2400" dirty="0">
+                <a:solidFill>
+                  <a:srgbClr val="7F007F"/>
+                </a:solidFill>
+                <a:latin typeface="Consolas"/>
+                <a:cs typeface="Consolas"/>
+              </a:rPr>
+              <a:t>.toggle </a:t>
+            </a:r>
+            <a:r>
+              <a:rPr lang="en-US" sz="2400" dirty="0">
+                <a:solidFill>
+                  <a:srgbClr val="0000FF"/>
+                </a:solidFill>
+                <a:latin typeface="Consolas"/>
+                <a:cs typeface="Consolas"/>
+              </a:rPr>
+              <a:t>{</a:t>
+            </a:r>
+            <a:r>
+              <a:rPr lang="en-US" sz="2400" dirty="0">
+                <a:solidFill>
+                  <a:prstClr val="black"/>
+                </a:solidFill>
+                <a:latin typeface="Consolas" panose="020B0609020204030204" pitchFamily="49" charset="0"/>
+                <a:cs typeface="Courier New"/>
+              </a:rPr>
+              <a:t> </a:t>
+            </a:r>
+          </a:p>
+          <a:p>
+            <a:pPr marL="373380" marR="5080"/>
+            <a:r>
+              <a:rPr lang="en-US" sz="2400" dirty="0">
+                <a:solidFill>
+                  <a:srgbClr val="FF0000"/>
+                </a:solidFill>
+                <a:latin typeface="Consolas"/>
+                <a:cs typeface="Consolas"/>
+              </a:rPr>
+              <a:t>	transform</a:t>
+            </a:r>
+            <a:r>
+              <a:rPr lang="en-US" sz="2400" dirty="0">
+                <a:solidFill>
+                  <a:srgbClr val="0000FF"/>
+                </a:solidFill>
+                <a:latin typeface="Consolas"/>
+                <a:cs typeface="Consolas"/>
+              </a:rPr>
+              <a:t>: </a:t>
+            </a:r>
+            <a:r>
+              <a:rPr lang="en-US" sz="2400" dirty="0" err="1">
+                <a:solidFill>
+                  <a:srgbClr val="0000FF"/>
+                </a:solidFill>
+                <a:latin typeface="Consolas"/>
+                <a:cs typeface="Consolas"/>
+              </a:rPr>
+              <a:t>rotateZ</a:t>
+            </a:r>
+            <a:r>
+              <a:rPr lang="en-US" sz="2400" dirty="0">
+                <a:solidFill>
+                  <a:srgbClr val="0000FF"/>
+                </a:solidFill>
+                <a:latin typeface="Consolas"/>
+                <a:cs typeface="Consolas"/>
+              </a:rPr>
+              <a:t>(</a:t>
+            </a:r>
+            <a:r>
+              <a:rPr lang="en-US" sz="2400" dirty="0" err="1">
+                <a:solidFill>
+                  <a:srgbClr val="0000FF"/>
+                </a:solidFill>
+                <a:latin typeface="Consolas"/>
+                <a:cs typeface="Consolas"/>
+              </a:rPr>
+              <a:t>0deg</a:t>
+            </a:r>
+            <a:r>
+              <a:rPr lang="en-US" sz="2400" dirty="0">
+                <a:solidFill>
+                  <a:srgbClr val="0000FF"/>
+                </a:solidFill>
+                <a:latin typeface="Consolas"/>
+                <a:cs typeface="Consolas"/>
+              </a:rPr>
+              <a:t>);</a:t>
+            </a:r>
+          </a:p>
+          <a:p>
+            <a:pPr marL="373380" marR="5080"/>
+            <a:r>
+              <a:rPr lang="en-US" sz="2400" dirty="0">
+                <a:solidFill>
+                  <a:srgbClr val="FF0000"/>
+                </a:solidFill>
+                <a:latin typeface="Consolas"/>
+              </a:rPr>
+              <a:t>	transition</a:t>
+            </a:r>
+            <a:r>
+              <a:rPr lang="en-US" sz="2400" dirty="0">
+                <a:solidFill>
+                  <a:srgbClr val="0000FF"/>
+                </a:solidFill>
+                <a:latin typeface="Consolas"/>
+                <a:cs typeface="Consolas"/>
+              </a:rPr>
+              <a:t>: all .</a:t>
+            </a:r>
+            <a:r>
+              <a:rPr lang="en-US" sz="2400" dirty="0" err="1">
+                <a:solidFill>
+                  <a:srgbClr val="0000FF"/>
+                </a:solidFill>
+                <a:latin typeface="Consolas"/>
+                <a:cs typeface="Consolas"/>
+              </a:rPr>
+              <a:t>11s</a:t>
+            </a:r>
+            <a:r>
+              <a:rPr lang="en-US" sz="2400" dirty="0">
+                <a:solidFill>
+                  <a:srgbClr val="0000FF"/>
+                </a:solidFill>
+                <a:latin typeface="Consolas"/>
+                <a:cs typeface="Consolas"/>
+              </a:rPr>
+              <a:t>;</a:t>
+            </a:r>
+            <a:endParaRPr lang="en-US" sz="2400" dirty="0">
+              <a:solidFill>
+                <a:srgbClr val="FF0000"/>
+              </a:solidFill>
+              <a:latin typeface="Consolas"/>
+            </a:endParaRPr>
+          </a:p>
+          <a:p>
+            <a:pPr marL="373380" marR="5080"/>
+            <a:r>
+              <a:rPr lang="en-US" sz="2400" dirty="0">
+                <a:solidFill>
+                  <a:srgbClr val="0000FF"/>
+                </a:solidFill>
+                <a:latin typeface="Consolas"/>
+                <a:cs typeface="Consolas"/>
+              </a:rPr>
+              <a:t>}</a:t>
+            </a:r>
+          </a:p>
+          <a:p>
+            <a:pPr marL="373380" marR="5080"/>
+            <a:endParaRPr lang="en-US" sz="2400" dirty="0">
+              <a:solidFill>
+                <a:srgbClr val="0000FF"/>
+              </a:solidFill>
+              <a:latin typeface="Consolas"/>
+              <a:cs typeface="Consolas"/>
+            </a:endParaRPr>
+          </a:p>
+          <a:p>
+            <a:pPr marL="373380" marR="5080"/>
+            <a:r>
+              <a:rPr lang="en-US" sz="2400" dirty="0">
+                <a:solidFill>
+                  <a:srgbClr val="7F007F"/>
+                </a:solidFill>
+                <a:latin typeface="Consolas"/>
+                <a:cs typeface="Consolas"/>
+              </a:rPr>
+              <a:t>.</a:t>
+            </a:r>
+            <a:r>
+              <a:rPr lang="en-US" sz="2400" dirty="0" err="1">
+                <a:solidFill>
+                  <a:srgbClr val="7F007F"/>
+                </a:solidFill>
+                <a:latin typeface="Consolas"/>
+                <a:cs typeface="Consolas"/>
+              </a:rPr>
+              <a:t>toggle:hover</a:t>
+            </a:r>
+            <a:r>
+              <a:rPr lang="en-US" sz="2400" dirty="0">
+                <a:solidFill>
+                  <a:srgbClr val="7F007F"/>
+                </a:solidFill>
+                <a:latin typeface="Consolas"/>
+                <a:cs typeface="Consolas"/>
+              </a:rPr>
+              <a:t> </a:t>
+            </a:r>
+            <a:r>
+              <a:rPr lang="en-US" sz="2400" dirty="0">
+                <a:solidFill>
+                  <a:srgbClr val="0000FF"/>
+                </a:solidFill>
+                <a:latin typeface="Consolas"/>
+                <a:cs typeface="Consolas"/>
+              </a:rPr>
+              <a:t>{</a:t>
+            </a:r>
+            <a:r>
+              <a:rPr lang="en-US" sz="2400" dirty="0">
+                <a:solidFill>
+                  <a:prstClr val="black"/>
+                </a:solidFill>
+                <a:latin typeface="Consolas" panose="020B0609020204030204" pitchFamily="49" charset="0"/>
+                <a:cs typeface="Courier New"/>
+              </a:rPr>
+              <a:t> </a:t>
+            </a:r>
+          </a:p>
+          <a:p>
+            <a:pPr marL="373380" marR="5080"/>
+            <a:r>
+              <a:rPr lang="en-US" sz="2400" dirty="0">
+                <a:solidFill>
+                  <a:srgbClr val="FF0000"/>
+                </a:solidFill>
+                <a:latin typeface="Consolas"/>
+                <a:cs typeface="Consolas"/>
+              </a:rPr>
+              <a:t>	transform</a:t>
+            </a:r>
+            <a:r>
+              <a:rPr lang="en-US" sz="2400" dirty="0">
+                <a:solidFill>
+                  <a:srgbClr val="0000FF"/>
+                </a:solidFill>
+                <a:latin typeface="Consolas"/>
+                <a:cs typeface="Consolas"/>
+              </a:rPr>
+              <a:t>: </a:t>
+            </a:r>
+            <a:r>
+              <a:rPr lang="en-US" sz="2400" dirty="0" err="1">
+                <a:solidFill>
+                  <a:srgbClr val="0000FF"/>
+                </a:solidFill>
+                <a:latin typeface="Consolas"/>
+                <a:cs typeface="Consolas"/>
+              </a:rPr>
+              <a:t>rotateZ</a:t>
+            </a:r>
+            <a:r>
+              <a:rPr lang="en-US" sz="2400" dirty="0">
+                <a:solidFill>
+                  <a:srgbClr val="0000FF"/>
+                </a:solidFill>
+                <a:latin typeface="Consolas"/>
+                <a:cs typeface="Consolas"/>
+              </a:rPr>
+              <a:t>(</a:t>
+            </a:r>
+            <a:r>
+              <a:rPr lang="en-US" sz="2400" dirty="0" err="1">
+                <a:solidFill>
+                  <a:srgbClr val="0000FF"/>
+                </a:solidFill>
+                <a:latin typeface="Consolas"/>
+                <a:cs typeface="Consolas"/>
+              </a:rPr>
+              <a:t>180deg</a:t>
+            </a:r>
+            <a:r>
+              <a:rPr lang="en-US" sz="2400" dirty="0">
+                <a:solidFill>
+                  <a:srgbClr val="0000FF"/>
+                </a:solidFill>
+                <a:latin typeface="Consolas"/>
+                <a:cs typeface="Consolas"/>
+              </a:rPr>
+              <a:t>);</a:t>
+            </a:r>
+          </a:p>
+          <a:p>
+            <a:pPr marL="373380" marR="5080"/>
+            <a:r>
+              <a:rPr lang="en-US" sz="2400" dirty="0">
+                <a:solidFill>
+                  <a:srgbClr val="0000FF"/>
+                </a:solidFill>
+                <a:latin typeface="Consolas"/>
+                <a:cs typeface="Consolas"/>
+              </a:rPr>
+              <a:t>}</a:t>
+            </a:r>
+          </a:p>
+        </p:txBody>
+      </p:sp>
+    </p:spTree>
+    <p:extLst>
+      <p:ext uri="{BB962C8B-B14F-4D97-AF65-F5344CB8AC3E}">
+        <p14:creationId xmlns:p14="http://schemas.microsoft.com/office/powerpoint/2010/main" val="2852319870"/>
+      </p:ext>
+    </p:extLst>
+  </p:cSld>
+  <p:clrMapOvr>
+    <a:masterClrMapping/>
+  </p:clrMapOvr>
+</p:sld>
+</file>
+
+<file path=ppt/slides/slide54.xml><?xml version="1.0" encoding="utf-8"?>
+<p:sld xmlns:a="http://schemas.openxmlformats.org/drawingml/2006/main" xmlns:r="http://schemas.openxmlformats.org/officeDocument/2006/relationships" xmlns:p="http://schemas.openxmlformats.org/presentationml/2006/main">
+  <p:cSld>
+    <p:spTree>
+      <p:nvGrpSpPr>
+        <p:cNvPr id="1" name=""/>
+        <p:cNvGrpSpPr/>
+        <p:nvPr/>
+      </p:nvGrpSpPr>
+      <p:grpSpPr>
+        <a:xfrm>
+          <a:off x="0" y="0"/>
+          <a:ext cx="0" cy="0"/>
+          <a:chOff x="0" y="0"/>
+          <a:chExt cx="0" cy="0"/>
+        </a:xfrm>
+      </p:grpSpPr>
+      <p:sp>
+        <p:nvSpPr>
+          <p:cNvPr id="2" name="object 2"/>
+          <p:cNvSpPr/>
+          <p:nvPr/>
+        </p:nvSpPr>
+        <p:spPr>
+          <a:xfrm>
+            <a:off x="0" y="0"/>
+            <a:ext cx="13004800" cy="9753600"/>
+          </a:xfrm>
+          <a:custGeom>
+            <a:avLst/>
+            <a:gdLst/>
+            <a:ahLst/>
+            <a:cxnLst/>
+            <a:rect l="l" t="t" r="r" b="b"/>
+            <a:pathLst>
+              <a:path w="13004800" h="9753600">
+                <a:moveTo>
+                  <a:pt x="0" y="9753600"/>
+                </a:moveTo>
+                <a:lnTo>
+                  <a:pt x="13004800" y="9753600"/>
+                </a:lnTo>
+                <a:lnTo>
+                  <a:pt x="13004800" y="0"/>
+                </a:lnTo>
+                <a:lnTo>
+                  <a:pt x="0" y="0"/>
+                </a:lnTo>
+                <a:lnTo>
+                  <a:pt x="0" y="9753600"/>
+                </a:lnTo>
+                <a:close/>
+              </a:path>
+            </a:pathLst>
+          </a:custGeom>
+          <a:solidFill>
+            <a:srgbClr val="35758E"/>
+          </a:solidFill>
+        </p:spPr>
+        <p:txBody>
+          <a:bodyPr wrap="square" lIns="0" tIns="0" rIns="0" bIns="0" rtlCol="0"/>
+          <a:lstStyle/>
+          <a:p>
+            <a:endParaRPr/>
+          </a:p>
+        </p:txBody>
+      </p:sp>
+      <p:sp>
+        <p:nvSpPr>
+          <p:cNvPr id="3" name="object 3"/>
+          <p:cNvSpPr txBox="1"/>
+          <p:nvPr/>
+        </p:nvSpPr>
+        <p:spPr>
+          <a:xfrm>
+            <a:off x="0" y="4495800"/>
+            <a:ext cx="13004800" cy="1194558"/>
+          </a:xfrm>
+          <a:prstGeom prst="rect">
+            <a:avLst/>
+          </a:prstGeom>
+        </p:spPr>
+        <p:txBody>
+          <a:bodyPr vert="horz" wrap="square" lIns="0" tIns="0" rIns="0" bIns="0" rtlCol="0">
+            <a:spAutoFit/>
+          </a:bodyPr>
+          <a:lstStyle/>
+          <a:p>
+            <a:pPr marL="12700" algn="ctr">
+              <a:lnSpc>
+                <a:spcPts val="9295"/>
+              </a:lnSpc>
+              <a:tabLst>
+                <a:tab pos="1709420" algn="l"/>
+                <a:tab pos="4170045" algn="l"/>
+              </a:tabLst>
+            </a:pPr>
+            <a:r>
+              <a:rPr lang="en-US" sz="7800" b="1" dirty="0">
+                <a:solidFill>
+                  <a:srgbClr val="FFFFFF"/>
+                </a:solidFill>
+                <a:latin typeface="Bebas Neue Bold"/>
+                <a:cs typeface="Bebas Neue Bold"/>
+              </a:rPr>
+              <a:t>“the grid”</a:t>
+            </a:r>
+            <a:endParaRPr sz="7800" dirty="0">
+              <a:latin typeface="Bebas Neue Bold"/>
+              <a:cs typeface="Bebas Neue Bold"/>
+            </a:endParaRPr>
+          </a:p>
+        </p:txBody>
+      </p:sp>
+    </p:spTree>
+    <p:extLst>
+      <p:ext uri="{BB962C8B-B14F-4D97-AF65-F5344CB8AC3E}">
+        <p14:creationId xmlns:p14="http://schemas.microsoft.com/office/powerpoint/2010/main" val="1569871600"/>
+      </p:ext>
+    </p:extLst>
+  </p:cSld>
+  <p:clrMapOvr>
+    <a:masterClrMapping/>
+  </p:clrMapOvr>
+</p:sld>
+</file>
+
+<file path=ppt/slides/slide55.xml><?xml version="1.0" encoding="utf-8"?>
+<p:sld xmlns:a="http://schemas.openxmlformats.org/drawingml/2006/main" xmlns:r="http://schemas.openxmlformats.org/officeDocument/2006/relationships" xmlns:p="http://schemas.openxmlformats.org/presentationml/2006/main">
+  <p:cSld>
+    <p:spTree>
+      <p:nvGrpSpPr>
+        <p:cNvPr id="1" name=""/>
+        <p:cNvGrpSpPr/>
+        <p:nvPr/>
+      </p:nvGrpSpPr>
+      <p:grpSpPr>
+        <a:xfrm>
+          <a:off x="0" y="0"/>
+          <a:ext cx="0" cy="0"/>
+          <a:chOff x="0" y="0"/>
+          <a:chExt cx="0" cy="0"/>
+        </a:xfrm>
+      </p:grpSpPr>
+      <p:sp>
+        <p:nvSpPr>
+          <p:cNvPr id="8" name="object 2">
+            <a:extLst>
+              <a:ext uri="{FF2B5EF4-FFF2-40B4-BE49-F238E27FC236}">
+                <a16:creationId xmlns:a16="http://schemas.microsoft.com/office/drawing/2014/main" id="{87352FD6-E060-4085-98A9-31CE4AD3432E}"/>
+              </a:ext>
+            </a:extLst>
+          </p:cNvPr>
+          <p:cNvSpPr/>
+          <p:nvPr/>
+        </p:nvSpPr>
+        <p:spPr>
+          <a:xfrm>
+            <a:off x="0" y="0"/>
+            <a:ext cx="13004800" cy="1661795"/>
+          </a:xfrm>
+          <a:custGeom>
+            <a:avLst/>
+            <a:gdLst/>
+            <a:ahLst/>
+            <a:cxnLst/>
+            <a:rect l="l" t="t" r="r" b="b"/>
+            <a:pathLst>
+              <a:path w="13004800" h="1661795">
+                <a:moveTo>
+                  <a:pt x="0" y="1661579"/>
+                </a:moveTo>
+                <a:lnTo>
+                  <a:pt x="0" y="0"/>
+                </a:lnTo>
+                <a:lnTo>
+                  <a:pt x="13004800" y="0"/>
+                </a:lnTo>
+                <a:lnTo>
+                  <a:pt x="13004800" y="1661579"/>
+                </a:lnTo>
+                <a:lnTo>
+                  <a:pt x="0" y="1661579"/>
+                </a:lnTo>
+                <a:close/>
+              </a:path>
+            </a:pathLst>
+          </a:custGeom>
+          <a:solidFill>
+            <a:srgbClr val="35758E"/>
+          </a:solidFill>
+        </p:spPr>
+        <p:txBody>
+          <a:bodyPr wrap="square" lIns="0" tIns="0" rIns="0" bIns="0" rtlCol="0"/>
+          <a:lstStyle/>
+          <a:p>
+            <a:endParaRPr/>
+          </a:p>
+        </p:txBody>
+      </p:sp>
+      <p:sp>
+        <p:nvSpPr>
+          <p:cNvPr id="3" name="object 3"/>
+          <p:cNvSpPr txBox="1">
+            <a:spLocks noGrp="1"/>
+          </p:cNvSpPr>
+          <p:nvPr>
+            <p:ph type="title"/>
+          </p:nvPr>
+        </p:nvSpPr>
+        <p:spPr>
+          <a:xfrm>
+            <a:off x="4597400" y="446176"/>
+            <a:ext cx="5870575" cy="769441"/>
+          </a:xfrm>
+          <a:prstGeom prst="rect">
+            <a:avLst/>
+          </a:prstGeom>
+        </p:spPr>
+        <p:txBody>
+          <a:bodyPr vert="horz" wrap="square" lIns="0" tIns="0" rIns="0" bIns="0" rtlCol="0">
+            <a:spAutoFit/>
+          </a:bodyPr>
+          <a:lstStyle/>
+          <a:p>
+            <a:pPr marL="12700">
+              <a:lnSpc>
+                <a:spcPts val="5995"/>
+              </a:lnSpc>
+            </a:pPr>
+            <a:r>
+              <a:rPr lang="en-US" spc="-20" dirty="0"/>
+              <a:t>bootstrap</a:t>
+            </a:r>
+            <a:endParaRPr dirty="0"/>
+          </a:p>
+        </p:txBody>
+      </p:sp>
+      <p:sp>
+        <p:nvSpPr>
+          <p:cNvPr id="6" name="object 6"/>
+          <p:cNvSpPr txBox="1"/>
+          <p:nvPr/>
+        </p:nvSpPr>
+        <p:spPr>
+          <a:xfrm>
+            <a:off x="1320800" y="2514600"/>
+            <a:ext cx="10690860" cy="3000821"/>
+          </a:xfrm>
+          <a:prstGeom prst="rect">
+            <a:avLst/>
+          </a:prstGeom>
+        </p:spPr>
+        <p:txBody>
+          <a:bodyPr vert="horz" wrap="square" lIns="0" tIns="0" rIns="0" bIns="0" rtlCol="0">
+            <a:spAutoFit/>
+          </a:bodyPr>
+          <a:lstStyle/>
+          <a:p>
+            <a:pPr marL="12700" marR="5080">
+              <a:spcBef>
+                <a:spcPts val="1550"/>
+              </a:spcBef>
+            </a:pPr>
+            <a:r>
+              <a:rPr lang="en-US" sz="3100" b="1" spc="45" dirty="0">
+                <a:solidFill>
+                  <a:srgbClr val="5F5F5F"/>
+                </a:solidFill>
+                <a:latin typeface="Georgia" panose="02040502050405020303" pitchFamily="18" charset="0"/>
+                <a:cs typeface="Lora"/>
+              </a:rPr>
+              <a:t>Bootstrap</a:t>
+            </a:r>
+            <a:r>
+              <a:rPr sz="3100" b="1" spc="45" dirty="0">
+                <a:solidFill>
+                  <a:srgbClr val="5F5F5F"/>
+                </a:solidFill>
+                <a:latin typeface="Georgia" panose="02040502050405020303" pitchFamily="18" charset="0"/>
+                <a:cs typeface="Lora"/>
+              </a:rPr>
+              <a:t> </a:t>
+            </a:r>
+            <a:r>
+              <a:rPr sz="3100" dirty="0">
+                <a:solidFill>
+                  <a:srgbClr val="5F5F5F"/>
+                </a:solidFill>
+                <a:latin typeface="Georgia" panose="02040502050405020303" pitchFamily="18" charset="0"/>
+                <a:cs typeface="Lora"/>
+              </a:rPr>
+              <a:t>is a </a:t>
+            </a:r>
+            <a:r>
+              <a:rPr lang="en-US" sz="3100" spc="-5" dirty="0">
+                <a:solidFill>
+                  <a:srgbClr val="5F5F5F"/>
+                </a:solidFill>
+                <a:latin typeface="Georgia" panose="02040502050405020303" pitchFamily="18" charset="0"/>
+                <a:cs typeface="Lora"/>
+              </a:rPr>
+              <a:t>CSS library you can import into a project to quickly provide some base styles for your project.</a:t>
+            </a:r>
+          </a:p>
+          <a:p>
+            <a:pPr marL="12700" marR="5080">
+              <a:spcBef>
+                <a:spcPts val="1550"/>
+              </a:spcBef>
+            </a:pPr>
+            <a:endParaRPr lang="en-US" sz="3100" spc="-5" dirty="0">
+              <a:solidFill>
+                <a:srgbClr val="5F5F5F"/>
+              </a:solidFill>
+              <a:latin typeface="Georgia" panose="02040502050405020303" pitchFamily="18" charset="0"/>
+              <a:cs typeface="Lora"/>
+            </a:endParaRPr>
+          </a:p>
+          <a:p>
+            <a:pPr marL="12700" marR="5080">
+              <a:spcBef>
+                <a:spcPts val="1550"/>
+              </a:spcBef>
+            </a:pPr>
+            <a:r>
+              <a:rPr lang="en-US" sz="3100" spc="-10" dirty="0">
+                <a:solidFill>
+                  <a:srgbClr val="5F5F5F"/>
+                </a:solidFill>
+                <a:latin typeface="Georgia" panose="02040502050405020303" pitchFamily="18" charset="0"/>
+                <a:cs typeface="Lora"/>
+                <a:hlinkClick r:id="rId2"/>
+              </a:rPr>
+              <a:t>http://getbootstrap.com/getting-started/</a:t>
+            </a:r>
+            <a:endParaRPr lang="en-US" sz="3100" spc="-10" dirty="0">
+              <a:solidFill>
+                <a:srgbClr val="5F5F5F"/>
+              </a:solidFill>
+              <a:latin typeface="Georgia" panose="02040502050405020303" pitchFamily="18" charset="0"/>
+              <a:cs typeface="Lora"/>
+            </a:endParaRPr>
+          </a:p>
+          <a:p>
+            <a:pPr marL="12700" marR="5080">
+              <a:spcBef>
+                <a:spcPts val="1550"/>
+              </a:spcBef>
+            </a:pPr>
+            <a:endParaRPr lang="en-US" sz="3100" spc="-10" dirty="0">
+              <a:solidFill>
+                <a:srgbClr val="5F5F5F"/>
+              </a:solidFill>
+              <a:latin typeface="Georgia" panose="02040502050405020303" pitchFamily="18" charset="0"/>
+              <a:cs typeface="Lora"/>
+            </a:endParaRPr>
+          </a:p>
+        </p:txBody>
+      </p:sp>
+      <p:pic>
+        <p:nvPicPr>
+          <p:cNvPr id="7" name="Picture 6"/>
+          <p:cNvPicPr>
+            <a:picLocks noChangeAspect="1"/>
+          </p:cNvPicPr>
+          <p:nvPr/>
+        </p:nvPicPr>
+        <p:blipFill>
+          <a:blip r:embed="rId3"/>
+          <a:stretch>
+            <a:fillRect/>
+          </a:stretch>
+        </p:blipFill>
+        <p:spPr>
+          <a:xfrm>
+            <a:off x="1320800" y="5562600"/>
+            <a:ext cx="8991600" cy="3367173"/>
+          </a:xfrm>
+          <a:prstGeom prst="rect">
+            <a:avLst/>
+          </a:prstGeom>
+        </p:spPr>
+      </p:pic>
+    </p:spTree>
+    <p:extLst>
+      <p:ext uri="{BB962C8B-B14F-4D97-AF65-F5344CB8AC3E}">
+        <p14:creationId xmlns:p14="http://schemas.microsoft.com/office/powerpoint/2010/main" val="1542566363"/>
+      </p:ext>
+    </p:extLst>
+  </p:cSld>
+  <p:clrMapOvr>
+    <a:masterClrMapping/>
+  </p:clrMapOvr>
+</p:sld>
+</file>
+
+<file path=ppt/slides/slide56.xml><?xml version="1.0" encoding="utf-8"?>
+<p:sld xmlns:a="http://schemas.openxmlformats.org/drawingml/2006/main" xmlns:r="http://schemas.openxmlformats.org/officeDocument/2006/relationships" xmlns:p="http://schemas.openxmlformats.org/presentationml/2006/main">
+  <p:cSld>
+    <p:spTree>
+      <p:nvGrpSpPr>
+        <p:cNvPr id="1" name=""/>
+        <p:cNvGrpSpPr/>
+        <p:nvPr/>
+      </p:nvGrpSpPr>
+      <p:grpSpPr>
+        <a:xfrm>
+          <a:off x="0" y="0"/>
+          <a:ext cx="0" cy="0"/>
+          <a:chOff x="0" y="0"/>
+          <a:chExt cx="0" cy="0"/>
+        </a:xfrm>
+      </p:grpSpPr>
+      <p:sp>
+        <p:nvSpPr>
+          <p:cNvPr id="8" name="object 2">
+            <a:extLst>
+              <a:ext uri="{FF2B5EF4-FFF2-40B4-BE49-F238E27FC236}">
+                <a16:creationId xmlns:a16="http://schemas.microsoft.com/office/drawing/2014/main" id="{0A2CBD18-6CEC-48FB-A87D-A3FD48375ABD}"/>
+              </a:ext>
+            </a:extLst>
+          </p:cNvPr>
+          <p:cNvSpPr/>
+          <p:nvPr/>
+        </p:nvSpPr>
+        <p:spPr>
+          <a:xfrm>
+            <a:off x="0" y="0"/>
+            <a:ext cx="13004800" cy="1661795"/>
+          </a:xfrm>
+          <a:custGeom>
+            <a:avLst/>
+            <a:gdLst/>
+            <a:ahLst/>
+            <a:cxnLst/>
+            <a:rect l="l" t="t" r="r" b="b"/>
+            <a:pathLst>
+              <a:path w="13004800" h="1661795">
+                <a:moveTo>
+                  <a:pt x="0" y="1661579"/>
+                </a:moveTo>
+                <a:lnTo>
+                  <a:pt x="0" y="0"/>
+                </a:lnTo>
+                <a:lnTo>
+                  <a:pt x="13004800" y="0"/>
+                </a:lnTo>
+                <a:lnTo>
+                  <a:pt x="13004800" y="1661579"/>
+                </a:lnTo>
+                <a:lnTo>
+                  <a:pt x="0" y="1661579"/>
+                </a:lnTo>
+                <a:close/>
+              </a:path>
+            </a:pathLst>
+          </a:custGeom>
+          <a:solidFill>
+            <a:srgbClr val="35758E"/>
           </a:solidFill>
         </p:spPr>
         <p:txBody>
@@ -19092,7 +20638,7 @@
 </p:sld>
 </file>
 
-<file path=ppt/slides/slide54.xml><?xml version="1.0" encoding="utf-8"?>
+<file path=ppt/slides/slide57.xml><?xml version="1.0" encoding="utf-8"?>
 <p:sld xmlns:a="http://schemas.openxmlformats.org/drawingml/2006/main" xmlns:r="http://schemas.openxmlformats.org/officeDocument/2006/relationships" xmlns:p="http://schemas.openxmlformats.org/presentationml/2006/main" showMasterSp="0">
   <p:cSld>
     <p:spTree>
@@ -19111,7 +20657,13 @@
       </p:grpSpPr>
       <p:sp>
         <p:nvSpPr>
-          <p:cNvPr id="2" name="object 2"/>
+          <p:cNvPr id="5" name="object 2">
+            <a:extLst>
+              <a:ext uri="{FF2B5EF4-FFF2-40B4-BE49-F238E27FC236}">
+                <a16:creationId xmlns:a16="http://schemas.microsoft.com/office/drawing/2014/main" id="{40206B3C-7741-4DC9-82BD-2F1BD9CF8BE4}"/>
+              </a:ext>
+            </a:extLst>
+          </p:cNvPr>
           <p:cNvSpPr/>
           <p:nvPr/>
         </p:nvSpPr>
@@ -19129,7 +20681,7 @@
             <a:pathLst>
               <a:path w="13004800" h="1661795">
                 <a:moveTo>
-                  <a:pt x="0" y="1661582"/>
+                  <a:pt x="0" y="1661579"/>
                 </a:moveTo>
                 <a:lnTo>
                   <a:pt x="0" y="0"/>
@@ -19138,17 +20690,17 @@
                   <a:pt x="13004800" y="0"/>
                 </a:lnTo>
                 <a:lnTo>
-                  <a:pt x="13004800" y="1661582"/>
-                </a:lnTo>
-                <a:lnTo>
-                  <a:pt x="0" y="1661582"/>
+                  <a:pt x="13004800" y="1661579"/>
+                </a:lnTo>
+                <a:lnTo>
+                  <a:pt x="0" y="1661579"/>
                 </a:lnTo>
                 <a:close/>
               </a:path>
             </a:pathLst>
           </a:custGeom>
           <a:solidFill>
-            <a:srgbClr val="209078"/>
+            <a:srgbClr val="35758E"/>
           </a:solidFill>
         </p:spPr>
         <p:txBody>

</xml_diff>